<commit_message>
Update Data Science_Project 1_Group2.pptx
</commit_message>
<xml_diff>
--- a/Data Science_Project 1_Group2.pptx
+++ b/Data Science_Project 1_Group2.pptx
@@ -5,24 +5,23 @@
     <p:sldMasterId id="2147483669" r:id="rId1"/>
   </p:sldMasterIdLst>
   <p:notesMasterIdLst>
-    <p:notesMasterId r:id="rId17"/>
+    <p:notesMasterId r:id="rId16"/>
   </p:notesMasterIdLst>
   <p:sldIdLst>
     <p:sldId id="256" r:id="rId2"/>
     <p:sldId id="258" r:id="rId3"/>
-    <p:sldId id="277" r:id="rId4"/>
-    <p:sldId id="269" r:id="rId5"/>
-    <p:sldId id="270" r:id="rId6"/>
-    <p:sldId id="271" r:id="rId7"/>
-    <p:sldId id="285" r:id="rId8"/>
-    <p:sldId id="274" r:id="rId9"/>
-    <p:sldId id="282" r:id="rId10"/>
-    <p:sldId id="283" r:id="rId11"/>
-    <p:sldId id="284" r:id="rId12"/>
-    <p:sldId id="280" r:id="rId13"/>
-    <p:sldId id="262" r:id="rId14"/>
-    <p:sldId id="263" r:id="rId15"/>
-    <p:sldId id="264" r:id="rId16"/>
+    <p:sldId id="269" r:id="rId4"/>
+    <p:sldId id="270" r:id="rId5"/>
+    <p:sldId id="271" r:id="rId6"/>
+    <p:sldId id="285" r:id="rId7"/>
+    <p:sldId id="274" r:id="rId8"/>
+    <p:sldId id="282" r:id="rId9"/>
+    <p:sldId id="283" r:id="rId10"/>
+    <p:sldId id="284" r:id="rId11"/>
+    <p:sldId id="280" r:id="rId12"/>
+    <p:sldId id="262" r:id="rId13"/>
+    <p:sldId id="263" r:id="rId14"/>
+    <p:sldId id="264" r:id="rId15"/>
   </p:sldIdLst>
   <p:sldSz cx="12192000" cy="6858000"/>
   <p:notesSz cx="6858000" cy="9144000"/>
@@ -132,7 +131,6 @@
         <p14:section name="Motivation &amp; Summary" id="{EB1AC145-4E59-438A-A903-9DF60FA7FEEF}">
           <p14:sldIdLst>
             <p14:sldId id="258"/>
-            <p14:sldId id="277"/>
           </p14:sldIdLst>
         </p14:section>
         <p14:section name="Questions &amp; Data" id="{71CC7010-D531-4ACB-93F9-023ECAEE58C4}">
@@ -7536,140 +7534,6 @@
 </p:notes>
 </file>
 
-<file path=ppt/notesSlides/notesSlide10.xml><?xml version="1.0" encoding="utf-8"?>
-<p:notes xmlns:a="http://schemas.openxmlformats.org/drawingml/2006/main" xmlns:r="http://schemas.openxmlformats.org/officeDocument/2006/relationships" xmlns:p="http://schemas.openxmlformats.org/presentationml/2006/main">
-  <p:cSld>
-    <p:spTree>
-      <p:nvGrpSpPr>
-        <p:cNvPr id="1" name=""/>
-        <p:cNvGrpSpPr/>
-        <p:nvPr/>
-      </p:nvGrpSpPr>
-      <p:grpSpPr>
-        <a:xfrm>
-          <a:off x="0" y="0"/>
-          <a:ext cx="0" cy="0"/>
-          <a:chOff x="0" y="0"/>
-          <a:chExt cx="0" cy="0"/>
-        </a:xfrm>
-      </p:grpSpPr>
-      <p:sp>
-        <p:nvSpPr>
-          <p:cNvPr id="2" name="Slide Image Placeholder 1"/>
-          <p:cNvSpPr>
-            <a:spLocks noGrp="1" noRot="1" noChangeAspect="1"/>
-          </p:cNvSpPr>
-          <p:nvPr>
-            <p:ph type="sldImg"/>
-          </p:nvPr>
-        </p:nvSpPr>
-        <p:spPr/>
-      </p:sp>
-      <p:sp>
-        <p:nvSpPr>
-          <p:cNvPr id="3" name="Notes Placeholder 2"/>
-          <p:cNvSpPr>
-            <a:spLocks noGrp="1"/>
-          </p:cNvSpPr>
-          <p:nvPr>
-            <p:ph type="body" idx="1"/>
-          </p:nvPr>
-        </p:nvSpPr>
-        <p:spPr/>
-        <p:txBody>
-          <a:bodyPr/>
-          <a:lstStyle/>
-          <a:p>
-            <a:r>
-              <a:rPr lang="en-US" i="1" dirty="0"/>
-              <a:t>*Discuss any difficulties that arose, and how you dealt with them</a:t>
-            </a:r>
-          </a:p>
-          <a:p>
-            <a:r>
-              <a:rPr lang="en-US" i="1" dirty="0"/>
-              <a:t>-We struggled finding a good data source that was both free and had a good range of data to manage. On the 2</a:t>
-            </a:r>
-            <a:r>
-              <a:rPr lang="en-US" i="1" baseline="30000" dirty="0"/>
-              <a:t>nd</a:t>
-            </a:r>
-            <a:r>
-              <a:rPr lang="en-US" i="1" dirty="0"/>
-              <a:t> day we had to change our project from beer to wine. </a:t>
-            </a:r>
-          </a:p>
-          <a:p>
-            <a:r>
-              <a:rPr lang="en-US" i="1" dirty="0"/>
-              <a:t>-Git branch was difficult for quite a few of us. </a:t>
-            </a:r>
-          </a:p>
-          <a:p>
-            <a:r>
-              <a:rPr lang="en-US" i="1" dirty="0"/>
-              <a:t>-Personal group wise difficulties…distribution of the project. So broad we didn’t know how to tackle it. </a:t>
-            </a:r>
-          </a:p>
-          <a:p>
-            <a:r>
-              <a:rPr lang="en-US" i="1" dirty="0"/>
-              <a:t>*Discuss any additional questions that came up, but which you didn't have time to answer: What would you research next, if you had two more weeks?</a:t>
-            </a:r>
-          </a:p>
-          <a:p>
-            <a:r>
-              <a:rPr lang="en-US" i="1" dirty="0"/>
-              <a:t>-We did think about doing a heat map of wineries in case if any enthusiasts ever wanted to go on a winery tour. However our data did not include coordinates so to actually get them all in a map it would’ve been a lengthy process we could not go through. </a:t>
-            </a:r>
-          </a:p>
-          <a:p>
-            <a:r>
-              <a:rPr lang="en-US" i="1" dirty="0"/>
-              <a:t>-Maybe grab more datasets. </a:t>
-            </a:r>
-          </a:p>
-          <a:p>
-            <a:endParaRPr lang="en-US" dirty="0"/>
-          </a:p>
-        </p:txBody>
-      </p:sp>
-      <p:sp>
-        <p:nvSpPr>
-          <p:cNvPr id="4" name="Slide Number Placeholder 3"/>
-          <p:cNvSpPr>
-            <a:spLocks noGrp="1"/>
-          </p:cNvSpPr>
-          <p:nvPr>
-            <p:ph type="sldNum" sz="quarter" idx="5"/>
-          </p:nvPr>
-        </p:nvSpPr>
-        <p:spPr/>
-        <p:txBody>
-          <a:bodyPr/>
-          <a:lstStyle/>
-          <a:p>
-            <a:fld id="{BAB621AC-7F6D-4100-88E3-7B288E0B79A4}" type="slidenum">
-              <a:rPr lang="en-US" smtClean="0"/>
-              <a:t>14</a:t>
-            </a:fld>
-            <a:endParaRPr lang="en-US"/>
-          </a:p>
-        </p:txBody>
-      </p:sp>
-    </p:spTree>
-    <p:extLst>
-      <p:ext uri="{BB962C8B-B14F-4D97-AF65-F5344CB8AC3E}">
-        <p14:creationId xmlns:p14="http://schemas.microsoft.com/office/powerpoint/2010/main" val="4082111051"/>
-      </p:ext>
-    </p:extLst>
-  </p:cSld>
-  <p:clrMapOvr>
-    <a:masterClrMapping/>
-  </p:clrMapOvr>
-</p:notes>
-</file>
-
 <file path=ppt/notesSlides/notesSlide2.xml><?xml version="1.0" encoding="utf-8"?>
 <p:notes xmlns:a="http://schemas.openxmlformats.org/drawingml/2006/main" xmlns:r="http://schemas.openxmlformats.org/officeDocument/2006/relationships" xmlns:p="http://schemas.openxmlformats.org/presentationml/2006/main">
   <p:cSld>
@@ -7891,6 +7755,118 @@
           <a:lstStyle/>
           <a:p>
             <a:r>
+              <a:rPr lang="en-US" b="1" dirty="0"/>
+              <a:t>Other Questions Asked</a:t>
+            </a:r>
+            <a:r>
+              <a:rPr lang="en-US" dirty="0"/>
+              <a:t>:</a:t>
+            </a:r>
+          </a:p>
+          <a:p>
+            <a:pPr lvl="1"/>
+            <a:r>
+              <a:rPr lang="en-US" dirty="0"/>
+              <a:t>Does California produce the highest quality (professionally rated) wine compared others?  </a:t>
+            </a:r>
+          </a:p>
+          <a:p>
+            <a:pPr lvl="2"/>
+            <a:r>
+              <a:rPr lang="en-US" sz="1500" dirty="0"/>
+              <a:t>Histogram- will show you the average professional rating of reviews of California wines vs all other wines</a:t>
+            </a:r>
+            <a:endParaRPr lang="en-US" sz="1500" b="1" dirty="0"/>
+          </a:p>
+          <a:p>
+            <a:pPr lvl="1"/>
+            <a:r>
+              <a:rPr lang="en-US" dirty="0"/>
+              <a:t>How does California wine reviews compare to the rest of the world when it comes to the variety of wines reviewed? </a:t>
+            </a:r>
+          </a:p>
+          <a:p>
+            <a:pPr lvl="2"/>
+            <a:r>
+              <a:rPr lang="en-US" sz="1500" dirty="0"/>
+              <a:t>Bar graph showing Top 10 provinces by variety and  Pie  chart showing the breakdown of top 20 varieties of wine globally (excluding CA) by review count.</a:t>
+            </a:r>
+          </a:p>
+          <a:p>
+            <a:pPr lvl="2"/>
+            <a:r>
+              <a:rPr lang="en-US" sz="1500" dirty="0"/>
+              <a:t>Both show higher variety count found in California</a:t>
+            </a:r>
+            <a:endParaRPr lang="en-US" sz="1500" b="1" dirty="0"/>
+          </a:p>
+          <a:p>
+            <a:pPr lvl="1"/>
+            <a:r>
+              <a:rPr lang="en-US" dirty="0"/>
+              <a:t>Does spending more get you better wine?</a:t>
+            </a:r>
+          </a:p>
+          <a:p>
+            <a:pPr lvl="2"/>
+            <a:r>
+              <a:rPr lang="en-US" sz="1500" dirty="0"/>
+              <a:t>Scatter plots showing moderately positive correlation coefficients </a:t>
+            </a:r>
+          </a:p>
+          <a:p>
+            <a:pPr lvl="2"/>
+            <a:r>
+              <a:rPr lang="en-US" sz="1500" dirty="0"/>
+              <a:t>Generally, the more expensive the wine, the higher the review rating.</a:t>
+            </a:r>
+          </a:p>
+          <a:p>
+            <a:pPr lvl="1"/>
+            <a:r>
+              <a:rPr lang="en-US" sz="2100" dirty="0"/>
+              <a:t>Can we show statistically that wines from California were quantitatively better based on a combination of price and review?</a:t>
+            </a:r>
+          </a:p>
+          <a:p>
+            <a:pPr lvl="2"/>
+            <a:r>
+              <a:rPr lang="en-US" sz="1400" dirty="0"/>
+              <a:t>New wine metric was calculated to better evaluate “best” wine</a:t>
+            </a:r>
+          </a:p>
+          <a:p>
+            <a:pPr lvl="2"/>
+            <a:r>
+              <a:rPr lang="en-US" sz="1400" dirty="0"/>
+              <a:t>Chi-Square test was performed using average new wine metric for California and Non-California wines</a:t>
+            </a:r>
+            <a:endParaRPr lang="en-US" dirty="0"/>
+          </a:p>
+          <a:p>
+            <a:endParaRPr lang="en-US" sz="1200" kern="1200" dirty="0">
+              <a:solidFill>
+                <a:schemeClr val="tx1"/>
+              </a:solidFill>
+              <a:effectLst/>
+              <a:latin typeface="+mn-lt"/>
+              <a:ea typeface="+mn-ea"/>
+              <a:cs typeface="+mn-cs"/>
+            </a:endParaRPr>
+          </a:p>
+          <a:p>
+            <a:endParaRPr lang="en-US" sz="1200" kern="1200" dirty="0">
+              <a:solidFill>
+                <a:schemeClr val="tx1"/>
+              </a:solidFill>
+              <a:effectLst/>
+              <a:latin typeface="+mn-lt"/>
+              <a:ea typeface="+mn-ea"/>
+              <a:cs typeface="+mn-cs"/>
+            </a:endParaRPr>
+          </a:p>
+          <a:p>
+            <a:r>
               <a:rPr lang="en-US" sz="1200" kern="1200" dirty="0">
                 <a:solidFill>
                   <a:schemeClr val="tx1"/>
@@ -7900,20 +7876,10 @@
                 <a:ea typeface="+mn-ea"/>
                 <a:cs typeface="+mn-cs"/>
               </a:rPr>
-              <a:t>*Describe the questions you asked, and </a:t>
-            </a:r>
-            <a:r>
-              <a:rPr lang="en-US" sz="1200" i="1" kern="1200" dirty="0">
-                <a:solidFill>
-                  <a:schemeClr val="tx1"/>
-                </a:solidFill>
-                <a:effectLst/>
-                <a:latin typeface="+mn-lt"/>
-                <a:ea typeface="+mn-ea"/>
-                <a:cs typeface="+mn-cs"/>
-              </a:rPr>
-              <a:t>_why_</a:t>
-            </a:r>
+              <a:t>* Elaborate on the questions you asked, describing what kinds of data you needed to answer them, and where you found it</a:t>
+            </a:r>
+          </a:p>
+          <a:p>
             <a:r>
               <a:rPr lang="en-US" sz="1200" kern="1200" dirty="0">
                 <a:solidFill>
@@ -7924,66 +7890,8 @@
                 <a:ea typeface="+mn-ea"/>
                 <a:cs typeface="+mn-cs"/>
               </a:rPr>
-              <a:t> you asked them</a:t>
-            </a:r>
-          </a:p>
-          <a:p>
-            <a:r>
-              <a:rPr lang="en-US" sz="1200" kern="1200" dirty="0">
-                <a:solidFill>
-                  <a:schemeClr val="tx1"/>
-                </a:solidFill>
-                <a:effectLst/>
-                <a:latin typeface="+mn-lt"/>
-                <a:ea typeface="+mn-ea"/>
-                <a:cs typeface="+mn-cs"/>
-              </a:rPr>
-              <a:t>-in the data set the purpose of the expert wine tasters is to give you their opinion/rating on how good the wine is. For someone that has never really explored that realm how to you exactly measure that. </a:t>
-            </a:r>
-          </a:p>
-          <a:p>
-            <a:r>
-              <a:rPr lang="en-US" sz="1200" kern="1200" dirty="0">
-                <a:solidFill>
-                  <a:schemeClr val="tx1"/>
-                </a:solidFill>
-                <a:effectLst/>
-                <a:latin typeface="+mn-lt"/>
-                <a:ea typeface="+mn-ea"/>
-                <a:cs typeface="+mn-cs"/>
-              </a:rPr>
-              <a:t>-used data metric and used our own metric</a:t>
-            </a:r>
-          </a:p>
-          <a:p>
-            <a:r>
-              <a:rPr lang="en-US" sz="1200" kern="1200" dirty="0">
-                <a:solidFill>
-                  <a:schemeClr val="tx1"/>
-                </a:solidFill>
-                <a:effectLst/>
-                <a:latin typeface="+mn-lt"/>
-                <a:ea typeface="+mn-ea"/>
-                <a:cs typeface="+mn-cs"/>
-              </a:rPr>
-              <a:t>  * Describe whether you were able to answer these questions to your satisfaction, and briefly summarize your findings</a:t>
-            </a:r>
-          </a:p>
-          <a:p>
-            <a:r>
-              <a:rPr lang="en-US" sz="1200" kern="1200" dirty="0">
-                <a:solidFill>
-                  <a:schemeClr val="tx1"/>
-                </a:solidFill>
-                <a:effectLst/>
-                <a:latin typeface="+mn-lt"/>
-                <a:ea typeface="+mn-ea"/>
-                <a:cs typeface="+mn-cs"/>
-              </a:rPr>
-              <a:t>-We were able to answer these questions. Not entirely satisfactory because more can always be done and added. We found out….</a:t>
-            </a:r>
-          </a:p>
-          <a:p>
+              <a:t>-These are the more narrowed down questions we asked to help answer the broader questions within motivation and summary. </a:t>
+            </a:r>
             <a:endParaRPr lang="en-US" dirty="0"/>
           </a:p>
         </p:txBody>
@@ -8014,7 +7922,7 @@
     </p:spTree>
     <p:extLst>
       <p:ext uri="{BB962C8B-B14F-4D97-AF65-F5344CB8AC3E}">
-        <p14:creationId xmlns:p14="http://schemas.microsoft.com/office/powerpoint/2010/main" val="2267763865"/>
+        <p14:creationId xmlns:p14="http://schemas.microsoft.com/office/powerpoint/2010/main" val="3065568247"/>
       </p:ext>
     </p:extLst>
   </p:cSld>
@@ -8069,31 +7977,37 @@
           <a:lstStyle/>
           <a:p>
             <a:r>
-              <a:rPr lang="en-US" sz="1200" kern="1200" dirty="0">
-                <a:solidFill>
-                  <a:schemeClr val="tx1"/>
-                </a:solidFill>
-                <a:effectLst/>
-                <a:latin typeface="+mn-lt"/>
-                <a:ea typeface="+mn-ea"/>
-                <a:cs typeface="+mn-cs"/>
-              </a:rPr>
-              <a:t>* Elaborate on the questions you asked, describing what kinds of data you needed to answer them, and where you found it</a:t>
-            </a:r>
-          </a:p>
-          <a:p>
-            <a:r>
-              <a:rPr lang="en-US" sz="1200" kern="1200" dirty="0">
-                <a:solidFill>
-                  <a:schemeClr val="tx1"/>
-                </a:solidFill>
-                <a:effectLst/>
-                <a:latin typeface="+mn-lt"/>
-                <a:ea typeface="+mn-ea"/>
-                <a:cs typeface="+mn-cs"/>
-              </a:rPr>
-              <a:t>-These are the more narrowed down questions we asked to help answer the broader questions within motivation and summary. </a:t>
-            </a:r>
+              <a:rPr lang="en-US" i="1" dirty="0"/>
+              <a:t>*Describe the exploration and cleanup process</a:t>
+            </a:r>
+          </a:p>
+          <a:p>
+            <a:r>
+              <a:rPr lang="en-US" i="1" dirty="0"/>
+              <a:t>*Discuss insights you had while exploring the data that you didn't anticipate</a:t>
+            </a:r>
+          </a:p>
+          <a:p>
+            <a:r>
+              <a:rPr lang="en-US" i="1" dirty="0"/>
+              <a:t>*Discuss any problems that arose after exploring the data, and how you resolved them</a:t>
+            </a:r>
+          </a:p>
+          <a:p>
+            <a:r>
+              <a:rPr lang="en-US" i="1" dirty="0"/>
+              <a:t>*Present and discuss interesting figures developed during exploration, ideally with the help of </a:t>
+            </a:r>
+            <a:r>
+              <a:rPr lang="en-US" i="1" dirty="0" err="1"/>
+              <a:t>Jupyter</a:t>
+            </a:r>
+            <a:r>
+              <a:rPr lang="en-US" i="1" dirty="0"/>
+              <a:t> Notebook</a:t>
+            </a:r>
+          </a:p>
+          <a:p>
             <a:endParaRPr lang="en-US" dirty="0"/>
           </a:p>
         </p:txBody>
@@ -8124,7 +8038,7 @@
     </p:spTree>
     <p:extLst>
       <p:ext uri="{BB962C8B-B14F-4D97-AF65-F5344CB8AC3E}">
-        <p14:creationId xmlns:p14="http://schemas.microsoft.com/office/powerpoint/2010/main" val="3065568247"/>
+        <p14:creationId xmlns:p14="http://schemas.microsoft.com/office/powerpoint/2010/main" val="2592296782"/>
       </p:ext>
     </p:extLst>
   </p:cSld>
@@ -8179,34 +8093,60 @@
           <a:lstStyle/>
           <a:p>
             <a:r>
-              <a:rPr lang="en-US" i="1" dirty="0"/>
-              <a:t>*Describe the exploration and cleanup process</a:t>
-            </a:r>
-          </a:p>
-          <a:p>
-            <a:r>
-              <a:rPr lang="en-US" i="1" dirty="0"/>
-              <a:t>*Discuss insights you had while exploring the data that you didn't anticipate</a:t>
-            </a:r>
-          </a:p>
-          <a:p>
-            <a:r>
-              <a:rPr lang="en-US" i="1" dirty="0"/>
-              <a:t>*Discuss any problems that arose after exploring the data, and how you resolved them</a:t>
-            </a:r>
-          </a:p>
-          <a:p>
-            <a:r>
-              <a:rPr lang="en-US" i="1" dirty="0"/>
-              <a:t>*Present and discuss interesting figures developed during exploration, ideally with the help of </a:t>
-            </a:r>
-            <a:r>
-              <a:rPr lang="en-US" i="1" dirty="0" err="1"/>
-              <a:t>Jupyter</a:t>
-            </a:r>
-            <a:r>
-              <a:rPr lang="en-US" i="1" dirty="0"/>
-              <a:t> Notebook</a:t>
+              <a:rPr lang="en-US" sz="1200" dirty="0"/>
+              <a:t>Original data had to be manipulated to be able to upload “starter” to GitHub.</a:t>
+            </a:r>
+          </a:p>
+          <a:p>
+            <a:r>
+              <a:rPr lang="en-US" sz="1200" dirty="0"/>
+              <a:t>Description and Designation columns dropped from the original 130k csv to create “dropped_wine_data.csv”</a:t>
+            </a:r>
+          </a:p>
+          <a:p>
+            <a:r>
+              <a:rPr lang="en-US" sz="1200" dirty="0"/>
+              <a:t>Got the counts of rows in each column.</a:t>
+            </a:r>
+          </a:p>
+          <a:p>
+            <a:r>
+              <a:rPr lang="en-US" sz="1200" dirty="0"/>
+              <a:t>Dropped unneeded columns.</a:t>
+            </a:r>
+          </a:p>
+          <a:p>
+            <a:r>
+              <a:rPr lang="en-US" sz="1200" dirty="0"/>
+              <a:t>Dropped any </a:t>
+            </a:r>
+            <a:r>
+              <a:rPr lang="en-US" sz="1200" dirty="0" err="1"/>
+              <a:t>NaN</a:t>
+            </a:r>
+            <a:r>
+              <a:rPr lang="en-US" sz="1200" dirty="0"/>
+              <a:t> records in the data.</a:t>
+            </a:r>
+          </a:p>
+          <a:p>
+            <a:r>
+              <a:rPr lang="en-US" sz="1200" dirty="0"/>
+              <a:t>Extracted ‘year’ from column title then recleaned the data for any new </a:t>
+            </a:r>
+            <a:r>
+              <a:rPr lang="en-US" sz="1200" dirty="0" err="1"/>
+              <a:t>NaN</a:t>
+            </a:r>
+            <a:r>
+              <a:rPr lang="en-US" sz="1200" dirty="0"/>
+              <a:t> values and dropped duplicate values</a:t>
+            </a:r>
+          </a:p>
+          <a:p>
+            <a:r>
+              <a:rPr lang="en-US" sz="1200" dirty="0"/>
+              <a:t>Renamed and deleted unneeded columns before exporting csv to other people working on the data.</a:t>
             </a:r>
           </a:p>
           <a:p>
@@ -8240,7 +8180,7 @@
     </p:spTree>
     <p:extLst>
       <p:ext uri="{BB962C8B-B14F-4D97-AF65-F5344CB8AC3E}">
-        <p14:creationId xmlns:p14="http://schemas.microsoft.com/office/powerpoint/2010/main" val="2592296782"/>
+        <p14:creationId xmlns:p14="http://schemas.microsoft.com/office/powerpoint/2010/main" val="827229101"/>
       </p:ext>
     </p:extLst>
   </p:cSld>
@@ -8294,64 +8234,6 @@
           <a:bodyPr/>
           <a:lstStyle/>
           <a:p>
-            <a:r>
-              <a:rPr lang="en-US" sz="1200" dirty="0"/>
-              <a:t>Original data had to be manipulated to be able to upload “starter” to GitHub.</a:t>
-            </a:r>
-          </a:p>
-          <a:p>
-            <a:r>
-              <a:rPr lang="en-US" sz="1200" dirty="0"/>
-              <a:t>Description and Designation columns dropped from the original 130k csv to create “dropped_wine_data.csv”</a:t>
-            </a:r>
-          </a:p>
-          <a:p>
-            <a:r>
-              <a:rPr lang="en-US" sz="1200" dirty="0"/>
-              <a:t>Got the counts of rows in each column.</a:t>
-            </a:r>
-          </a:p>
-          <a:p>
-            <a:r>
-              <a:rPr lang="en-US" sz="1200" dirty="0"/>
-              <a:t>Dropped unneeded columns.</a:t>
-            </a:r>
-          </a:p>
-          <a:p>
-            <a:r>
-              <a:rPr lang="en-US" sz="1200" dirty="0"/>
-              <a:t>Dropped any </a:t>
-            </a:r>
-            <a:r>
-              <a:rPr lang="en-US" sz="1200" dirty="0" err="1"/>
-              <a:t>NaN</a:t>
-            </a:r>
-            <a:r>
-              <a:rPr lang="en-US" sz="1200" dirty="0"/>
-              <a:t> records in the data.</a:t>
-            </a:r>
-          </a:p>
-          <a:p>
-            <a:r>
-              <a:rPr lang="en-US" sz="1200" dirty="0"/>
-              <a:t>Extracted ‘year’ from column title then recleaned the data for any new </a:t>
-            </a:r>
-            <a:r>
-              <a:rPr lang="en-US" sz="1200" dirty="0" err="1"/>
-              <a:t>NaN</a:t>
-            </a:r>
-            <a:r>
-              <a:rPr lang="en-US" sz="1200" dirty="0"/>
-              <a:t> values and dropped duplicate values</a:t>
-            </a:r>
-          </a:p>
-          <a:p>
-            <a:r>
-              <a:rPr lang="en-US" sz="1200" dirty="0"/>
-              <a:t>Renamed and deleted unneeded columns before exporting csv to other people working on the data.</a:t>
-            </a:r>
-          </a:p>
-          <a:p>
             <a:endParaRPr lang="en-US" dirty="0"/>
           </a:p>
         </p:txBody>
@@ -8373,7 +8255,7 @@
           <a:p>
             <a:fld id="{BAB621AC-7F6D-4100-88E3-7B288E0B79A4}" type="slidenum">
               <a:rPr lang="en-US" smtClean="0"/>
-              <a:t>6</a:t>
+              <a:t>8</a:t>
             </a:fld>
             <a:endParaRPr lang="en-US"/>
           </a:p>
@@ -8382,7 +8264,7 @@
     </p:spTree>
     <p:extLst>
       <p:ext uri="{BB962C8B-B14F-4D97-AF65-F5344CB8AC3E}">
-        <p14:creationId xmlns:p14="http://schemas.microsoft.com/office/powerpoint/2010/main" val="827229101"/>
+        <p14:creationId xmlns:p14="http://schemas.microsoft.com/office/powerpoint/2010/main" val="326368979"/>
       </p:ext>
     </p:extLst>
   </p:cSld>
@@ -8457,7 +8339,7 @@
           <a:p>
             <a:fld id="{BAB621AC-7F6D-4100-88E3-7B288E0B79A4}" type="slidenum">
               <a:rPr lang="en-US" smtClean="0"/>
-              <a:t>9</a:t>
+              <a:t>10</a:t>
             </a:fld>
             <a:endParaRPr lang="en-US"/>
           </a:p>
@@ -8466,7 +8348,7 @@
     </p:spTree>
     <p:extLst>
       <p:ext uri="{BB962C8B-B14F-4D97-AF65-F5344CB8AC3E}">
-        <p14:creationId xmlns:p14="http://schemas.microsoft.com/office/powerpoint/2010/main" val="326368979"/>
+        <p14:creationId xmlns:p14="http://schemas.microsoft.com/office/powerpoint/2010/main" val="2054630840"/>
       </p:ext>
     </p:extLst>
   </p:cSld>
@@ -8520,6 +8402,137 @@
           <a:bodyPr/>
           <a:lstStyle/>
           <a:p>
+            <a:pPr marL="0" marR="0" lvl="0" indent="0" algn="l" defTabSz="914400" rtl="0" eaLnBrk="1" fontAlgn="auto" latinLnBrk="0" hangingPunct="1">
+              <a:lnSpc>
+                <a:spcPct val="100000"/>
+              </a:lnSpc>
+              <a:spcBef>
+                <a:spcPts val="0"/>
+              </a:spcBef>
+              <a:spcAft>
+                <a:spcPts val="0"/>
+              </a:spcAft>
+              <a:buClrTx/>
+              <a:buSzTx/>
+              <a:buFontTx/>
+              <a:buNone/>
+              <a:tabLst/>
+              <a:defRPr/>
+            </a:pPr>
+            <a:r>
+              <a:rPr lang="en-US" i="1" dirty="0"/>
+              <a:t>*Discuss your findings. Did you find what you expected to find? If not, why not? What inferences or general conclusions can you draw from your analysis?</a:t>
+            </a:r>
+          </a:p>
+          <a:p>
+            <a:r>
+              <a:rPr lang="en-US" sz="1200" kern="1200" dirty="0">
+                <a:solidFill>
+                  <a:schemeClr val="tx1"/>
+                </a:solidFill>
+                <a:effectLst/>
+                <a:latin typeface="+mn-lt"/>
+                <a:ea typeface="+mn-ea"/>
+                <a:cs typeface="+mn-cs"/>
+              </a:rPr>
+              <a:t>-what was the country of origin---found it interesting it was mainly in the us</a:t>
+            </a:r>
+          </a:p>
+          <a:p>
+            <a:r>
+              <a:rPr lang="en-US" sz="1200" kern="1200" dirty="0">
+                <a:solidFill>
+                  <a:schemeClr val="tx1"/>
+                </a:solidFill>
+                <a:effectLst/>
+                <a:latin typeface="+mn-lt"/>
+                <a:ea typeface="+mn-ea"/>
+                <a:cs typeface="+mn-cs"/>
+              </a:rPr>
+              <a:t>if there was a certain wine that was reviewed more than another—pinot noir is second chardonnay</a:t>
+            </a:r>
+          </a:p>
+          <a:p>
+            <a:r>
+              <a:rPr lang="en-US" sz="1200" kern="1200" dirty="0">
+                <a:solidFill>
+                  <a:schemeClr val="tx1"/>
+                </a:solidFill>
+                <a:effectLst/>
+                <a:latin typeface="+mn-lt"/>
+                <a:ea typeface="+mn-ea"/>
+                <a:cs typeface="+mn-cs"/>
+              </a:rPr>
+              <a:t>	-</a:t>
+            </a:r>
+            <a:r>
+              <a:rPr lang="en-US" sz="1200" kern="1200" dirty="0" err="1">
+                <a:solidFill>
+                  <a:schemeClr val="tx1"/>
+                </a:solidFill>
+                <a:effectLst/>
+                <a:latin typeface="+mn-lt"/>
+                <a:ea typeface="+mn-ea"/>
+                <a:cs typeface="+mn-cs"/>
+              </a:rPr>
+              <a:t>california</a:t>
+            </a:r>
+            <a:r>
+              <a:rPr lang="en-US" sz="1200" kern="1200" dirty="0">
+                <a:solidFill>
+                  <a:schemeClr val="tx1"/>
+                </a:solidFill>
+                <a:effectLst/>
+                <a:latin typeface="+mn-lt"/>
+                <a:ea typeface="+mn-ea"/>
+                <a:cs typeface="+mn-cs"/>
+              </a:rPr>
+              <a:t> and globally were the same</a:t>
+            </a:r>
+          </a:p>
+          <a:p>
+            <a:r>
+              <a:rPr lang="en-US" sz="1200" kern="1200" dirty="0">
+                <a:solidFill>
+                  <a:schemeClr val="tx1"/>
+                </a:solidFill>
+                <a:effectLst/>
+                <a:latin typeface="+mn-lt"/>
+                <a:ea typeface="+mn-ea"/>
+                <a:cs typeface="+mn-cs"/>
+              </a:rPr>
+              <a:t>California is know for it’s zinfandel (#5)…but it’s not important to the rest of the world</a:t>
+            </a:r>
+          </a:p>
+          <a:p>
+            <a:r>
+              <a:rPr lang="en-US" sz="1200" kern="1200" dirty="0">
+                <a:solidFill>
+                  <a:schemeClr val="tx1"/>
+                </a:solidFill>
+                <a:effectLst/>
+                <a:latin typeface="+mn-lt"/>
+                <a:ea typeface="+mn-ea"/>
+                <a:cs typeface="+mn-cs"/>
+              </a:rPr>
+              <a:t>Variety looking at top 20 wines reviewed vs. </a:t>
+            </a:r>
+          </a:p>
+          <a:p>
+            <a:r>
+              <a:rPr lang="en-US" sz="1200" kern="1200" dirty="0">
+                <a:solidFill>
+                  <a:schemeClr val="tx1"/>
+                </a:solidFill>
+                <a:effectLst/>
+                <a:latin typeface="+mn-lt"/>
+                <a:ea typeface="+mn-ea"/>
+                <a:cs typeface="+mn-cs"/>
+              </a:rPr>
+              <a:t>Most wines fell under $250 per dollar</a:t>
+            </a:r>
+          </a:p>
+          <a:p>
             <a:endParaRPr lang="en-US" dirty="0"/>
           </a:p>
         </p:txBody>
@@ -8541,7 +8554,7 @@
           <a:p>
             <a:fld id="{BAB621AC-7F6D-4100-88E3-7B288E0B79A4}" type="slidenum">
               <a:rPr lang="en-US" smtClean="0"/>
-              <a:t>11</a:t>
+              <a:t>12</a:t>
             </a:fld>
             <a:endParaRPr lang="en-US"/>
           </a:p>
@@ -8550,7 +8563,7 @@
     </p:spTree>
     <p:extLst>
       <p:ext uri="{BB962C8B-B14F-4D97-AF65-F5344CB8AC3E}">
-        <p14:creationId xmlns:p14="http://schemas.microsoft.com/office/powerpoint/2010/main" val="2054630840"/>
+        <p14:creationId xmlns:p14="http://schemas.microsoft.com/office/powerpoint/2010/main" val="1505219277"/>
       </p:ext>
     </p:extLst>
   </p:cSld>
@@ -8604,134 +8617,53 @@
           <a:bodyPr/>
           <a:lstStyle/>
           <a:p>
-            <a:pPr marL="0" marR="0" lvl="0" indent="0" algn="l" defTabSz="914400" rtl="0" eaLnBrk="1" fontAlgn="auto" latinLnBrk="0" hangingPunct="1">
-              <a:lnSpc>
-                <a:spcPct val="100000"/>
-              </a:lnSpc>
-              <a:spcBef>
-                <a:spcPts val="0"/>
-              </a:spcBef>
-              <a:spcAft>
-                <a:spcPts val="0"/>
-              </a:spcAft>
-              <a:buClrTx/>
-              <a:buSzTx/>
-              <a:buFontTx/>
-              <a:buNone/>
-              <a:tabLst/>
-              <a:defRPr/>
-            </a:pPr>
             <a:r>
               <a:rPr lang="en-US" i="1" dirty="0"/>
-              <a:t>*Discuss your findings. Did you find what you expected to find? If not, why not? What inferences or general conclusions can you draw from your analysis?</a:t>
-            </a:r>
-          </a:p>
-          <a:p>
-            <a:r>
-              <a:rPr lang="en-US" sz="1200" kern="1200" dirty="0">
-                <a:solidFill>
-                  <a:schemeClr val="tx1"/>
-                </a:solidFill>
-                <a:effectLst/>
-                <a:latin typeface="+mn-lt"/>
-                <a:ea typeface="+mn-ea"/>
-                <a:cs typeface="+mn-cs"/>
-              </a:rPr>
-              <a:t>-what was the country of origin---found it interesting it was mainly in the us</a:t>
-            </a:r>
-          </a:p>
-          <a:p>
-            <a:r>
-              <a:rPr lang="en-US" sz="1200" kern="1200" dirty="0">
-                <a:solidFill>
-                  <a:schemeClr val="tx1"/>
-                </a:solidFill>
-                <a:effectLst/>
-                <a:latin typeface="+mn-lt"/>
-                <a:ea typeface="+mn-ea"/>
-                <a:cs typeface="+mn-cs"/>
-              </a:rPr>
-              <a:t>if there was a certain wine that was reviewed more than another—pinot noir is second chardonnay</a:t>
-            </a:r>
-          </a:p>
-          <a:p>
-            <a:r>
-              <a:rPr lang="en-US" sz="1200" kern="1200" dirty="0">
-                <a:solidFill>
-                  <a:schemeClr val="tx1"/>
-                </a:solidFill>
-                <a:effectLst/>
-                <a:latin typeface="+mn-lt"/>
-                <a:ea typeface="+mn-ea"/>
-                <a:cs typeface="+mn-cs"/>
-              </a:rPr>
-              <a:t>	-</a:t>
-            </a:r>
-            <a:r>
-              <a:rPr lang="en-US" sz="1200" kern="1200" dirty="0" err="1">
-                <a:solidFill>
-                  <a:schemeClr val="tx1"/>
-                </a:solidFill>
-                <a:effectLst/>
-                <a:latin typeface="+mn-lt"/>
-                <a:ea typeface="+mn-ea"/>
-                <a:cs typeface="+mn-cs"/>
-              </a:rPr>
-              <a:t>california</a:t>
-            </a:r>
-            <a:r>
-              <a:rPr lang="en-US" sz="1200" kern="1200" dirty="0">
-                <a:solidFill>
-                  <a:schemeClr val="tx1"/>
-                </a:solidFill>
-                <a:effectLst/>
-                <a:latin typeface="+mn-lt"/>
-                <a:ea typeface="+mn-ea"/>
-                <a:cs typeface="+mn-cs"/>
-              </a:rPr>
-              <a:t> and globally were the same</a:t>
-            </a:r>
-          </a:p>
-          <a:p>
-            <a:r>
-              <a:rPr lang="en-US" sz="1200" kern="1200" dirty="0">
-                <a:solidFill>
-                  <a:schemeClr val="tx1"/>
-                </a:solidFill>
-                <a:effectLst/>
-                <a:latin typeface="+mn-lt"/>
-                <a:ea typeface="+mn-ea"/>
-                <a:cs typeface="+mn-cs"/>
-              </a:rPr>
-              <a:t>California is know for it’s zinfandel (#5)…but it’s not important to the rest of the world</a:t>
-            </a:r>
-          </a:p>
-          <a:p>
-            <a:r>
-              <a:rPr lang="en-US" sz="1200" kern="1200" dirty="0">
-                <a:solidFill>
-                  <a:schemeClr val="tx1"/>
-                </a:solidFill>
-                <a:effectLst/>
-                <a:latin typeface="+mn-lt"/>
-                <a:ea typeface="+mn-ea"/>
-                <a:cs typeface="+mn-cs"/>
-              </a:rPr>
-              <a:t>Variety looking at top 20 wines reviewed vs. </a:t>
-            </a:r>
-          </a:p>
-          <a:p>
-            <a:r>
-              <a:rPr lang="en-US" sz="1200" kern="1200" dirty="0">
-                <a:solidFill>
-                  <a:schemeClr val="tx1"/>
-                </a:solidFill>
-                <a:effectLst/>
-                <a:latin typeface="+mn-lt"/>
-                <a:ea typeface="+mn-ea"/>
-                <a:cs typeface="+mn-cs"/>
-              </a:rPr>
-              <a:t>Most wines fell under $250 per dollar</a:t>
+              <a:t>*Discuss any difficulties that arose, and how you dealt with them</a:t>
+            </a:r>
+          </a:p>
+          <a:p>
+            <a:r>
+              <a:rPr lang="en-US" i="1" dirty="0"/>
+              <a:t>-We struggled finding a good data source that was both free and had a good range of data to manage. On the 2</a:t>
+            </a:r>
+            <a:r>
+              <a:rPr lang="en-US" i="1" baseline="30000" dirty="0"/>
+              <a:t>nd</a:t>
+            </a:r>
+            <a:r>
+              <a:rPr lang="en-US" i="1" dirty="0"/>
+              <a:t> day we had to change our project from beer to wine. </a:t>
+            </a:r>
+          </a:p>
+          <a:p>
+            <a:r>
+              <a:rPr lang="en-US" i="1" dirty="0"/>
+              <a:t>-Git branch was difficult for quite a few of us. </a:t>
+            </a:r>
+          </a:p>
+          <a:p>
+            <a:r>
+              <a:rPr lang="en-US" i="1" dirty="0"/>
+              <a:t>-Personal group wise difficulties…distribution of the project. So broad we didn’t know how to tackle it. </a:t>
+            </a:r>
+          </a:p>
+          <a:p>
+            <a:r>
+              <a:rPr lang="en-US" i="1" dirty="0"/>
+              <a:t>*Discuss any additional questions that came up, but which you didn't have time to answer: What would you research next, if you had two more weeks?</a:t>
+            </a:r>
+          </a:p>
+          <a:p>
+            <a:r>
+              <a:rPr lang="en-US" i="1" dirty="0"/>
+              <a:t>-We did think about doing a heat map of wineries in case if any enthusiasts ever wanted to go on a winery tour. However our data did not include coordinates so to actually get them all in a map it would’ve been a lengthy process we could not go through. </a:t>
+            </a:r>
+          </a:p>
+          <a:p>
+            <a:r>
+              <a:rPr lang="en-US" i="1" dirty="0"/>
+              <a:t>-Maybe grab more datasets. </a:t>
             </a:r>
           </a:p>
           <a:p>
@@ -8765,7 +8697,7 @@
     </p:spTree>
     <p:extLst>
       <p:ext uri="{BB962C8B-B14F-4D97-AF65-F5344CB8AC3E}">
-        <p14:creationId xmlns:p14="http://schemas.microsoft.com/office/powerpoint/2010/main" val="1505219277"/>
+        <p14:creationId xmlns:p14="http://schemas.microsoft.com/office/powerpoint/2010/main" val="4082111051"/>
       </p:ext>
     </p:extLst>
   </p:cSld>
@@ -16945,13 +16877,13 @@
   <p:clrMapOvr>
     <a:masterClrMapping/>
   </p:clrMapOvr>
-  <mc:AlternateContent xmlns:mc="http://schemas.openxmlformats.org/markup-compatibility/2006">
-    <mc:Choice xmlns:p14="http://schemas.microsoft.com/office/powerpoint/2010/main" Requires="p14">
+  <mc:AlternateContent xmlns:mc="http://schemas.openxmlformats.org/markup-compatibility/2006" xmlns:p14="http://schemas.microsoft.com/office/powerpoint/2010/main">
+    <mc:Choice Requires="p14">
       <p:transition spd="med" p14:dur="700">
         <p:fade/>
       </p:transition>
     </mc:Choice>
-    <mc:Fallback>
+    <mc:Fallback xmlns="">
       <p:transition spd="med">
         <p:fade/>
       </p:transition>
@@ -16961,312 +16893,6 @@
 </file>
 
 <file path=ppt/slides/slide10.xml><?xml version="1.0" encoding="utf-8"?>
-<p:sld xmlns:a="http://schemas.openxmlformats.org/drawingml/2006/main" xmlns:r="http://schemas.openxmlformats.org/officeDocument/2006/relationships" xmlns:p="http://schemas.openxmlformats.org/presentationml/2006/main">
-  <p:cSld>
-    <p:bg>
-      <p:bgPr>
-        <a:gradFill rotWithShape="1">
-          <a:gsLst>
-            <a:gs pos="0">
-              <a:schemeClr val="bg2">
-                <a:tint val="96000"/>
-                <a:shade val="100000"/>
-                <a:hueMod val="106000"/>
-                <a:satMod val="220000"/>
-                <a:lumMod val="140000"/>
-              </a:schemeClr>
-            </a:gs>
-            <a:gs pos="50000">
-              <a:schemeClr val="bg2">
-                <a:shade val="100000"/>
-                <a:hueMod val="100000"/>
-                <a:satMod val="110000"/>
-                <a:lumMod val="130000"/>
-              </a:schemeClr>
-            </a:gs>
-            <a:gs pos="100000">
-              <a:schemeClr val="bg2">
-                <a:shade val="69000"/>
-                <a:hueMod val="88000"/>
-                <a:satMod val="160000"/>
-                <a:lumMod val="69000"/>
-              </a:schemeClr>
-            </a:gs>
-          </a:gsLst>
-          <a:lin ang="2520000" scaled="0"/>
-        </a:gradFill>
-        <a:effectLst/>
-      </p:bgPr>
-    </p:bg>
-    <p:spTree>
-      <p:nvGrpSpPr>
-        <p:cNvPr id="1" name=""/>
-        <p:cNvGrpSpPr/>
-        <p:nvPr/>
-      </p:nvGrpSpPr>
-      <p:grpSpPr>
-        <a:xfrm>
-          <a:off x="0" y="0"/>
-          <a:ext cx="0" cy="0"/>
-          <a:chOff x="0" y="0"/>
-          <a:chExt cx="0" cy="0"/>
-        </a:xfrm>
-      </p:grpSpPr>
-      <p:sp>
-        <p:nvSpPr>
-          <p:cNvPr id="2" name="Title 1">
-            <a:extLst>
-              <a:ext uri="{FF2B5EF4-FFF2-40B4-BE49-F238E27FC236}">
-                <a16:creationId xmlns:a16="http://schemas.microsoft.com/office/drawing/2014/main" id="{F4EA0C0F-80C1-4432-ADF2-4FD4A189BEBB}"/>
-              </a:ext>
-            </a:extLst>
-          </p:cNvPr>
-          <p:cNvSpPr>
-            <a:spLocks noGrp="1"/>
-          </p:cNvSpPr>
-          <p:nvPr>
-            <p:ph type="title"/>
-          </p:nvPr>
-        </p:nvSpPr>
-        <p:spPr>
-          <a:xfrm>
-            <a:off x="680321" y="753228"/>
-            <a:ext cx="9613861" cy="1080938"/>
-          </a:xfrm>
-        </p:spPr>
-        <p:txBody>
-          <a:bodyPr>
-            <a:normAutofit/>
-          </a:bodyPr>
-          <a:lstStyle/>
-          <a:p>
-            <a:r>
-              <a:rPr lang="en-US" sz="2800" dirty="0"/>
-              <a:t>How does California wine reviews compare to the rest of the world when it comes to the variety of wines reviewed?</a:t>
-            </a:r>
-          </a:p>
-        </p:txBody>
-      </p:sp>
-      <p:sp>
-        <p:nvSpPr>
-          <p:cNvPr id="1032" name="Content Placeholder 1031">
-            <a:extLst>
-              <a:ext uri="{FF2B5EF4-FFF2-40B4-BE49-F238E27FC236}">
-                <a16:creationId xmlns:a16="http://schemas.microsoft.com/office/drawing/2014/main" id="{D315F114-2879-441D-A372-ADC006B3B75D}"/>
-              </a:ext>
-            </a:extLst>
-          </p:cNvPr>
-          <p:cNvSpPr>
-            <a:spLocks noGrp="1"/>
-          </p:cNvSpPr>
-          <p:nvPr>
-            <p:ph idx="1"/>
-          </p:nvPr>
-        </p:nvSpPr>
-        <p:spPr>
-          <a:xfrm>
-            <a:off x="294453" y="2370350"/>
-            <a:ext cx="3091578" cy="3590183"/>
-          </a:xfrm>
-        </p:spPr>
-        <p:txBody>
-          <a:bodyPr>
-            <a:normAutofit/>
-          </a:bodyPr>
-          <a:lstStyle/>
-          <a:p>
-            <a:endParaRPr lang="en-US" sz="2000" dirty="0"/>
-          </a:p>
-          <a:p>
-            <a:r>
-              <a:rPr lang="en-US" sz="2000" dirty="0"/>
-              <a:t>Higher variety count found in California</a:t>
-            </a:r>
-          </a:p>
-          <a:p>
-            <a:endParaRPr lang="en-US" sz="2000" dirty="0"/>
-          </a:p>
-          <a:p>
-            <a:r>
-              <a:rPr lang="en-US" sz="2000" dirty="0"/>
-              <a:t>12 of the top 20 varieties found in CA are found within the top 20 varieties globally (excluding CA)</a:t>
-            </a:r>
-          </a:p>
-          <a:p>
-            <a:endParaRPr lang="en-US" sz="2000" dirty="0"/>
-          </a:p>
-          <a:p>
-            <a:pPr marL="0" indent="0">
-              <a:buNone/>
-            </a:pPr>
-            <a:endParaRPr lang="en-US" sz="2000" dirty="0"/>
-          </a:p>
-        </p:txBody>
-      </p:sp>
-      <p:pic>
-        <p:nvPicPr>
-          <p:cNvPr id="1026" name="Picture 2">
-            <a:extLst>
-              <a:ext uri="{FF2B5EF4-FFF2-40B4-BE49-F238E27FC236}">
-                <a16:creationId xmlns:a16="http://schemas.microsoft.com/office/drawing/2014/main" id="{AD16B1AE-B834-4F0E-B75E-37B09C5A85D6}"/>
-              </a:ext>
-            </a:extLst>
-          </p:cNvPr>
-          <p:cNvPicPr>
-            <a:picLocks noChangeAspect="1" noChangeArrowheads="1"/>
-          </p:cNvPicPr>
-          <p:nvPr/>
-        </p:nvPicPr>
-        <p:blipFill rotWithShape="1">
-          <a:blip r:embed="rId2">
-            <a:extLst>
-              <a:ext uri="{28A0092B-C50C-407E-A947-70E740481C1C}">
-                <a14:useLocalDpi xmlns:a14="http://schemas.microsoft.com/office/drawing/2010/main" val="0"/>
-              </a:ext>
-            </a:extLst>
-          </a:blip>
-          <a:srcRect l="2656" r="17740"/>
-          <a:stretch/>
-        </p:blipFill>
-        <p:spPr bwMode="auto">
-          <a:xfrm>
-            <a:off x="3492725" y="2286000"/>
-            <a:ext cx="3762323" cy="4329290"/>
-          </a:xfrm>
-          <a:prstGeom prst="rect">
-            <a:avLst/>
-          </a:prstGeom>
-          <a:noFill/>
-          <a:ln>
-            <a:noFill/>
-          </a:ln>
-          <a:effectLst>
-            <a:outerShdw blurRad="76200" dist="63500" dir="5040000" algn="tl" rotWithShape="0">
-              <a:srgbClr val="000000">
-                <a:alpha val="41000"/>
-              </a:srgbClr>
-            </a:outerShdw>
-          </a:effectLst>
-          <a:extLst>
-            <a:ext uri="{909E8E84-426E-40DD-AFC4-6F175D3DCCD1}">
-              <a14:hiddenFill xmlns:a14="http://schemas.microsoft.com/office/drawing/2010/main">
-                <a:solidFill>
-                  <a:srgbClr val="FFFFFF"/>
-                </a:solidFill>
-              </a14:hiddenFill>
-            </a:ext>
-          </a:extLst>
-        </p:spPr>
-      </p:pic>
-      <p:sp>
-        <p:nvSpPr>
-          <p:cNvPr id="4" name="TextBox 3">
-            <a:extLst>
-              <a:ext uri="{FF2B5EF4-FFF2-40B4-BE49-F238E27FC236}">
-                <a16:creationId xmlns:a16="http://schemas.microsoft.com/office/drawing/2014/main" id="{F7FCB200-52E9-4D10-B10D-F206C66D2C0B}"/>
-              </a:ext>
-            </a:extLst>
-          </p:cNvPr>
-          <p:cNvSpPr txBox="1"/>
-          <p:nvPr/>
-        </p:nvSpPr>
-        <p:spPr>
-          <a:xfrm>
-            <a:off x="7475805" y="2308770"/>
-            <a:ext cx="4421742" cy="400110"/>
-          </a:xfrm>
-          <a:prstGeom prst="rect">
-            <a:avLst/>
-          </a:prstGeom>
-          <a:noFill/>
-        </p:spPr>
-        <p:txBody>
-          <a:bodyPr wrap="square" rtlCol="0">
-            <a:spAutoFit/>
-          </a:bodyPr>
-          <a:lstStyle/>
-          <a:p>
-            <a:r>
-              <a:rPr lang="en-US" sz="1000" b="1" dirty="0"/>
-              <a:t>Breakdown of top 20 varieties of wine globally (excluding CA) by review count </a:t>
-            </a:r>
-            <a:endParaRPr lang="en-US" sz="1000" dirty="0"/>
-          </a:p>
-        </p:txBody>
-      </p:sp>
-      <p:pic>
-        <p:nvPicPr>
-          <p:cNvPr id="1030" name="Picture 6">
-            <a:extLst>
-              <a:ext uri="{FF2B5EF4-FFF2-40B4-BE49-F238E27FC236}">
-                <a16:creationId xmlns:a16="http://schemas.microsoft.com/office/drawing/2014/main" id="{8F549CA4-6651-48D9-B005-3F0A8FAE0178}"/>
-              </a:ext>
-            </a:extLst>
-          </p:cNvPr>
-          <p:cNvPicPr>
-            <a:picLocks noChangeAspect="1" noChangeArrowheads="1"/>
-          </p:cNvPicPr>
-          <p:nvPr/>
-        </p:nvPicPr>
-        <p:blipFill>
-          <a:blip r:embed="rId3">
-            <a:extLst>
-              <a:ext uri="{28A0092B-C50C-407E-A947-70E740481C1C}">
-                <a14:useLocalDpi xmlns:a14="http://schemas.microsoft.com/office/drawing/2010/main" val="0"/>
-              </a:ext>
-            </a:extLst>
-          </a:blip>
-          <a:srcRect/>
-          <a:stretch>
-            <a:fillRect/>
-          </a:stretch>
-        </p:blipFill>
-        <p:spPr bwMode="auto">
-          <a:xfrm>
-            <a:off x="7475805" y="2720912"/>
-            <a:ext cx="4421742" cy="3894378"/>
-          </a:xfrm>
-          <a:prstGeom prst="rect">
-            <a:avLst/>
-          </a:prstGeom>
-          <a:noFill/>
-          <a:extLst>
-            <a:ext uri="{909E8E84-426E-40DD-AFC4-6F175D3DCCD1}">
-              <a14:hiddenFill xmlns:a14="http://schemas.microsoft.com/office/drawing/2010/main">
-                <a:solidFill>
-                  <a:srgbClr val="FFFFFF"/>
-                </a:solidFill>
-              </a14:hiddenFill>
-            </a:ext>
-          </a:extLst>
-        </p:spPr>
-      </p:pic>
-    </p:spTree>
-    <p:extLst>
-      <p:ext uri="{BB962C8B-B14F-4D97-AF65-F5344CB8AC3E}">
-        <p14:creationId xmlns:p14="http://schemas.microsoft.com/office/powerpoint/2010/main" val="578842426"/>
-      </p:ext>
-    </p:extLst>
-  </p:cSld>
-  <p:clrMapOvr>
-    <a:masterClrMapping/>
-  </p:clrMapOvr>
-  <mc:AlternateContent xmlns:mc="http://schemas.openxmlformats.org/markup-compatibility/2006">
-    <mc:Choice xmlns:p14="http://schemas.microsoft.com/office/powerpoint/2010/main" Requires="p14">
-      <p:transition spd="med" p14:dur="700">
-        <p:fade/>
-      </p:transition>
-    </mc:Choice>
-    <mc:Fallback>
-      <p:transition spd="med">
-        <p:fade/>
-      </p:transition>
-    </mc:Fallback>
-  </mc:AlternateContent>
-</p:sld>
-</file>
-
-<file path=ppt/slides/slide11.xml><?xml version="1.0" encoding="utf-8"?>
 <p:sld xmlns:a="http://schemas.openxmlformats.org/drawingml/2006/main" xmlns:r="http://schemas.openxmlformats.org/officeDocument/2006/relationships" xmlns:p="http://schemas.openxmlformats.org/presentationml/2006/main">
   <p:cSld>
     <p:bg>
@@ -17473,8 +17099,8 @@
         </p:nvSpPr>
         <p:spPr>
           <a:xfrm>
-            <a:off x="680321" y="3215410"/>
-            <a:ext cx="3188665" cy="2308324"/>
+            <a:off x="540362" y="2504716"/>
+            <a:ext cx="3188665" cy="3785652"/>
           </a:xfrm>
           <a:prstGeom prst="rect">
             <a:avLst/>
@@ -17492,19 +17118,16 @@
               <a:buChar char="•"/>
             </a:pPr>
             <a:r>
-              <a:rPr lang="en-US" dirty="0"/>
+              <a:rPr lang="en-US" sz="2400" dirty="0"/>
               <a:t>Moderately positive correlation coefficients observed in both plots.</a:t>
             </a:r>
-          </a:p>
-          <a:p>
-            <a:endParaRPr lang="en-US" dirty="0"/>
           </a:p>
           <a:p>
             <a:pPr marL="285750" indent="-285750">
               <a:buFont typeface="Arial" panose="020B0604020202020204" pitchFamily="34" charset="0"/>
               <a:buChar char="•"/>
             </a:pPr>
-            <a:endParaRPr lang="en-US" dirty="0"/>
+            <a:endParaRPr lang="en-US" sz="2400" dirty="0"/>
           </a:p>
           <a:p>
             <a:pPr marL="285750" indent="-285750">
@@ -17512,7 +17135,7 @@
               <a:buChar char="•"/>
             </a:pPr>
             <a:r>
-              <a:rPr lang="en-US" dirty="0"/>
+              <a:rPr lang="en-US" sz="2400" dirty="0"/>
               <a:t>Generally, the more expensive the wine, the higher the review rating.</a:t>
             </a:r>
           </a:p>
@@ -17606,13 +17229,13 @@
   <p:clrMapOvr>
     <a:masterClrMapping/>
   </p:clrMapOvr>
-  <mc:AlternateContent xmlns:mc="http://schemas.openxmlformats.org/markup-compatibility/2006">
-    <mc:Choice xmlns:p14="http://schemas.microsoft.com/office/powerpoint/2010/main" Requires="p14">
+  <mc:AlternateContent xmlns:mc="http://schemas.openxmlformats.org/markup-compatibility/2006" xmlns:p14="http://schemas.microsoft.com/office/powerpoint/2010/main">
+    <mc:Choice Requires="p14">
       <p:transition spd="med" p14:dur="700">
         <p:fade/>
       </p:transition>
     </mc:Choice>
-    <mc:Fallback>
+    <mc:Fallback xmlns="">
       <p:transition spd="med">
         <p:fade/>
       </p:transition>
@@ -17621,7 +17244,7 @@
 </p:sld>
 </file>
 
-<file path=ppt/slides/slide12.xml><?xml version="1.0" encoding="utf-8"?>
+<file path=ppt/slides/slide11.xml><?xml version="1.0" encoding="utf-8"?>
 <p:sld xmlns:a="http://schemas.openxmlformats.org/drawingml/2006/main" xmlns:r="http://schemas.openxmlformats.org/officeDocument/2006/relationships" xmlns:p="http://schemas.openxmlformats.org/presentationml/2006/main">
   <p:cSld>
     <p:spTree>
@@ -17680,8 +17303,8 @@
         </p:nvSpPr>
         <p:spPr>
           <a:xfrm>
-            <a:off x="970844" y="2393244"/>
-            <a:ext cx="7484534" cy="3970318"/>
+            <a:off x="913694" y="2154570"/>
+            <a:ext cx="9201856" cy="4401205"/>
           </a:xfrm>
           <a:prstGeom prst="rect">
             <a:avLst/>
@@ -17699,8 +17322,8 @@
               <a:buChar char="•"/>
             </a:pPr>
             <a:r>
-              <a:rPr lang="en-US" dirty="0"/>
-              <a:t>New wine metric was calculated to better evaluate “best” wine</a:t>
+              <a:rPr lang="en-US" sz="2000" dirty="0"/>
+              <a:t>New Wine Metric was calculated to better evaluate “best” wine</a:t>
             </a:r>
           </a:p>
           <a:p>
@@ -17709,12 +17332,12 @@
               <a:buChar char="•"/>
             </a:pPr>
             <a:r>
-              <a:rPr lang="en-US" dirty="0"/>
+              <a:rPr lang="en-US" sz="2000" dirty="0"/>
               <a:t>New Wine Metric = price/points - 79 </a:t>
             </a:r>
           </a:p>
           <a:p>
-            <a:endParaRPr lang="en-US" dirty="0"/>
+            <a:endParaRPr lang="en-US" sz="2000" dirty="0"/>
           </a:p>
           <a:p>
             <a:pPr marL="285750" indent="-285750">
@@ -17722,36 +17345,36 @@
               <a:buChar char="•"/>
             </a:pPr>
             <a:r>
-              <a:rPr lang="en-US" dirty="0"/>
+              <a:rPr lang="en-US" sz="2000" dirty="0"/>
               <a:t>Chi-Square test was performed using average new wine metric for California and Non-California wines</a:t>
             </a:r>
+          </a:p>
+          <a:p>
+            <a:endParaRPr lang="en-US" sz="2000" dirty="0"/>
           </a:p>
           <a:p>
             <a:pPr marL="285750" indent="-285750">
               <a:buFont typeface="Arial" panose="020B0604020202020204" pitchFamily="34" charset="0"/>
               <a:buChar char="•"/>
             </a:pPr>
-            <a:endParaRPr lang="en-US" dirty="0"/>
-          </a:p>
-          <a:p>
-            <a:endParaRPr lang="en-US" dirty="0"/>
+            <a:r>
+              <a:rPr lang="en-US" sz="2000" dirty="0"/>
+              <a:t>Null hypothesis: There is no significant statistical difference between the observed wine metric values and our expected. </a:t>
+            </a:r>
           </a:p>
           <a:p>
             <a:pPr marL="285750" indent="-285750">
               <a:buFont typeface="Arial" panose="020B0604020202020204" pitchFamily="34" charset="0"/>
               <a:buChar char="•"/>
             </a:pPr>
-            <a:r>
-              <a:rPr lang="en-US" dirty="0"/>
-              <a:t>Null hypothesis: There is no significant statistical difference between the observed wine metric values and our expected. </a:t>
-            </a:r>
+            <a:endParaRPr lang="en-US" sz="2000" dirty="0"/>
           </a:p>
           <a:p>
             <a:pPr marL="285750" indent="-285750">
               <a:buFont typeface="Arial" panose="020B0604020202020204" pitchFamily="34" charset="0"/>
               <a:buChar char="•"/>
             </a:pPr>
-            <a:endParaRPr lang="en-US" dirty="0"/>
+            <a:endParaRPr lang="en-US" sz="2000" dirty="0"/>
           </a:p>
           <a:p>
             <a:pPr marL="285750" indent="-285750">
@@ -17759,15 +17382,15 @@
               <a:buChar char="•"/>
             </a:pPr>
             <a:r>
-              <a:rPr lang="en-US" dirty="0"/>
+              <a:rPr lang="en-US" sz="2000" dirty="0"/>
               <a:t>Critical Value = 3.841         X</a:t>
             </a:r>
             <a:r>
-              <a:rPr lang="en-US" sz="1600" baseline="30000" dirty="0"/>
+              <a:rPr lang="en-US" baseline="30000" dirty="0"/>
               <a:t>2</a:t>
             </a:r>
             <a:r>
-              <a:rPr lang="en-US" dirty="0"/>
+              <a:rPr lang="en-US" sz="2000" dirty="0"/>
               <a:t> = 0.128</a:t>
             </a:r>
           </a:p>
@@ -17776,7 +17399,7 @@
               <a:buFont typeface="Arial" panose="020B0604020202020204" pitchFamily="34" charset="0"/>
               <a:buChar char="•"/>
             </a:pPr>
-            <a:endParaRPr lang="en-US" dirty="0"/>
+            <a:endParaRPr lang="en-US" sz="2000" dirty="0"/>
           </a:p>
           <a:p>
             <a:pPr marL="285750" indent="-285750">
@@ -17784,15 +17407,15 @@
               <a:buChar char="•"/>
             </a:pPr>
             <a:r>
-              <a:rPr lang="en-US" dirty="0"/>
+              <a:rPr lang="en-US" sz="2000" dirty="0"/>
               <a:t>We would not reject our null hypothesis as X</a:t>
             </a:r>
             <a:r>
-              <a:rPr lang="en-US" sz="1600" baseline="30000" dirty="0"/>
+              <a:rPr lang="en-US" baseline="30000" dirty="0"/>
               <a:t>2  </a:t>
             </a:r>
             <a:r>
-              <a:rPr lang="en-US" dirty="0"/>
+              <a:rPr lang="en-US" sz="2000" dirty="0"/>
               <a:t>is lower than our critical value.</a:t>
             </a:r>
           </a:p>
@@ -17838,13 +17461,13 @@
   <p:clrMapOvr>
     <a:masterClrMapping/>
   </p:clrMapOvr>
-  <mc:AlternateContent xmlns:mc="http://schemas.openxmlformats.org/markup-compatibility/2006">
-    <mc:Choice xmlns:p14="http://schemas.microsoft.com/office/powerpoint/2010/main" Requires="p14">
+  <mc:AlternateContent xmlns:mc="http://schemas.openxmlformats.org/markup-compatibility/2006" xmlns:p14="http://schemas.microsoft.com/office/powerpoint/2010/main">
+    <mc:Choice Requires="p14">
       <p:transition spd="med" p14:dur="700">
         <p:fade/>
       </p:transition>
     </mc:Choice>
-    <mc:Fallback>
+    <mc:Fallback xmlns="">
       <p:transition spd="med">
         <p:fade/>
       </p:transition>
@@ -17853,7 +17476,7 @@
 </p:sld>
 </file>
 
-<file path=ppt/slides/slide13.xml><?xml version="1.0" encoding="utf-8"?>
+<file path=ppt/slides/slide12.xml><?xml version="1.0" encoding="utf-8"?>
 <p:sld xmlns:a="http://schemas.openxmlformats.org/drawingml/2006/main" xmlns:r="http://schemas.openxmlformats.org/officeDocument/2006/relationships" xmlns:p="http://schemas.openxmlformats.org/presentationml/2006/main">
   <p:cSld>
     <p:bg>
@@ -18239,13 +17862,13 @@
         </p:nvSpPr>
         <p:spPr>
           <a:xfrm>
-            <a:off x="680322" y="2336872"/>
-            <a:ext cx="10581236" cy="3173591"/>
+            <a:off x="680322" y="2309052"/>
+            <a:ext cx="10581236" cy="4120323"/>
           </a:xfrm>
         </p:spPr>
         <p:txBody>
           <a:bodyPr>
-            <a:normAutofit/>
+            <a:normAutofit fontScale="92500" lnSpcReduction="20000"/>
           </a:bodyPr>
           <a:lstStyle/>
           <a:p>
@@ -18256,7 +17879,7 @@
             </a:pPr>
             <a:r>
               <a:rPr lang="en-US" sz="2800" dirty="0"/>
-              <a:t>Most reviews/wine came from US</a:t>
+              <a:t>Most reviews were based on wine that came from US. Wine Enthusiast is a US Based Company and likely targets a US audience.</a:t>
             </a:r>
           </a:p>
           <a:p>
@@ -18267,7 +17890,15 @@
             </a:pPr>
             <a:r>
               <a:rPr lang="en-US" sz="2800" dirty="0"/>
-              <a:t>Pinot Noir is most reviewed</a:t>
+              <a:t>Pinot Noir was the most frequently reviewed wine type in our dataset but only if we included the California otherwise it fell to 3</a:t>
+            </a:r>
+            <a:r>
+              <a:rPr lang="en-US" sz="2800" baseline="30000" dirty="0"/>
+              <a:t>rd</a:t>
+            </a:r>
+            <a:r>
+              <a:rPr lang="en-US" sz="2800" dirty="0"/>
+              <a:t>.</a:t>
             </a:r>
           </a:p>
           <a:p>
@@ -18278,7 +17909,7 @@
             </a:pPr>
             <a:r>
               <a:rPr lang="en-US" sz="2800" dirty="0"/>
-              <a:t>California Zinfandel</a:t>
+              <a:t>California Zinfandel while in the top 5 most reviewed wine from America wasn’t even in the top 20 worldwide</a:t>
             </a:r>
           </a:p>
           <a:p>
@@ -18289,18 +17920,7 @@
             </a:pPr>
             <a:r>
               <a:rPr lang="en-US" sz="2800" dirty="0"/>
-              <a:t>Most wines under $250</a:t>
-            </a:r>
-          </a:p>
-          <a:p>
-            <a:pPr>
-              <a:lnSpc>
-                <a:spcPct val="120000"/>
-              </a:lnSpc>
-            </a:pPr>
-            <a:r>
-              <a:rPr lang="en-US" sz="2800" dirty="0"/>
-              <a:t>Etc.</a:t>
+              <a:t>There is an ample selection (at least 312 from our data) of “good value” wines where your money will go further.</a:t>
             </a:r>
           </a:p>
         </p:txBody>
@@ -18396,13 +18016,13 @@
   <p:clrMapOvr>
     <a:masterClrMapping/>
   </p:clrMapOvr>
-  <mc:AlternateContent xmlns:mc="http://schemas.openxmlformats.org/markup-compatibility/2006">
-    <mc:Choice xmlns:p14="http://schemas.microsoft.com/office/powerpoint/2010/main" Requires="p14">
+  <mc:AlternateContent xmlns:mc="http://schemas.openxmlformats.org/markup-compatibility/2006" xmlns:p14="http://schemas.microsoft.com/office/powerpoint/2010/main">
+    <mc:Choice Requires="p14">
       <p:transition spd="med" p14:dur="700">
         <p:fade/>
       </p:transition>
     </mc:Choice>
-    <mc:Fallback>
+    <mc:Fallback xmlns="">
       <p:transition spd="med">
         <p:fade/>
       </p:transition>
@@ -18411,7 +18031,7 @@
 </p:sld>
 </file>
 
-<file path=ppt/slides/slide14.xml><?xml version="1.0" encoding="utf-8"?>
+<file path=ppt/slides/slide13.xml><?xml version="1.0" encoding="utf-8"?>
 <p:sld xmlns:a="http://schemas.openxmlformats.org/drawingml/2006/main" xmlns:r="http://schemas.openxmlformats.org/officeDocument/2006/relationships" xmlns:p="http://schemas.openxmlformats.org/presentationml/2006/main">
   <p:cSld>
     <p:spTree>
@@ -18474,7 +18094,7 @@
         </p:nvPicPr>
         <p:blipFill>
           <a:blip r:embed="rId3">
-            <a:alphaModFix amt="44000"/>
+            <a:alphaModFix amt="25000"/>
             <a:extLst>
               <a:ext uri="{837473B0-CC2E-450A-ABE3-18F120FF3D39}">
                 <a1611:picAttrSrcUrl xmlns:a1611="http://schemas.microsoft.com/office/drawing/2016/11/main" r:id="rId4"/>
@@ -18528,6 +18148,122 @@
           </a:xfrm>
         </p:spPr>
       </p:pic>
+      <p:sp>
+        <p:nvSpPr>
+          <p:cNvPr id="3" name="TextBox 2">
+            <a:extLst>
+              <a:ext uri="{FF2B5EF4-FFF2-40B4-BE49-F238E27FC236}">
+                <a16:creationId xmlns:a16="http://schemas.microsoft.com/office/drawing/2014/main" id="{2DA0D3A0-34E7-4787-B24B-4A5A79B68507}"/>
+              </a:ext>
+            </a:extLst>
+          </p:cNvPr>
+          <p:cNvSpPr txBox="1"/>
+          <p:nvPr/>
+        </p:nvSpPr>
+        <p:spPr>
+          <a:xfrm>
+            <a:off x="617782" y="2165938"/>
+            <a:ext cx="10579553" cy="4154984"/>
+          </a:xfrm>
+          <a:prstGeom prst="rect">
+            <a:avLst/>
+          </a:prstGeom>
+          <a:noFill/>
+        </p:spPr>
+        <p:txBody>
+          <a:bodyPr wrap="square" rtlCol="0">
+            <a:spAutoFit/>
+          </a:bodyPr>
+          <a:lstStyle/>
+          <a:p>
+            <a:pPr marL="285750" indent="-285750">
+              <a:buFont typeface="Arial" panose="020B0604020202020204" pitchFamily="34" charset="0"/>
+              <a:buChar char="•"/>
+            </a:pPr>
+            <a:r>
+              <a:rPr lang="en-US" sz="2400" dirty="0"/>
+              <a:t>Difficulties:</a:t>
+            </a:r>
+          </a:p>
+          <a:p>
+            <a:pPr marL="742950" lvl="1" indent="-285750">
+              <a:buFont typeface="Arial" panose="020B0604020202020204" pitchFamily="34" charset="0"/>
+              <a:buChar char="•"/>
+            </a:pPr>
+            <a:r>
+              <a:rPr lang="en-US" sz="2400" dirty="0"/>
+              <a:t>Data Sourcing – Finding our Dataset</a:t>
+            </a:r>
+          </a:p>
+          <a:p>
+            <a:pPr marL="1200150" lvl="2" indent="-285750">
+              <a:buFont typeface="Arial" panose="020B0604020202020204" pitchFamily="34" charset="0"/>
+              <a:buChar char="•"/>
+            </a:pPr>
+            <a:r>
+              <a:rPr lang="en-US" sz="2400" dirty="0"/>
+              <a:t>Beer API Challenges</a:t>
+            </a:r>
+          </a:p>
+          <a:p>
+            <a:pPr marL="742950" lvl="1" indent="-285750">
+              <a:buFont typeface="Arial" panose="020B0604020202020204" pitchFamily="34" charset="0"/>
+              <a:buChar char="•"/>
+            </a:pPr>
+            <a:r>
+              <a:rPr lang="en-US" sz="2400" dirty="0"/>
+              <a:t>Git Challenges with branching merging and resolving code conflicts</a:t>
+            </a:r>
+          </a:p>
+          <a:p>
+            <a:pPr marL="742950" lvl="1" indent="-285750">
+              <a:buFont typeface="Arial" panose="020B0604020202020204" pitchFamily="34" charset="0"/>
+              <a:buChar char="•"/>
+            </a:pPr>
+            <a:r>
+              <a:rPr lang="en-US" sz="2400" dirty="0"/>
+              <a:t>Timeline and Project Organizational Challenges</a:t>
+            </a:r>
+          </a:p>
+          <a:p>
+            <a:pPr marL="742950" lvl="1" indent="-285750">
+              <a:buFont typeface="Arial" panose="020B0604020202020204" pitchFamily="34" charset="0"/>
+              <a:buChar char="•"/>
+            </a:pPr>
+            <a:r>
+              <a:rPr lang="en-US" sz="2400" dirty="0"/>
+              <a:t>API Challenges – trying to think of creative ways to use the dataset to leverage semi familiar Google API’s</a:t>
+            </a:r>
+          </a:p>
+          <a:p>
+            <a:pPr marL="285750" indent="-285750">
+              <a:buFont typeface="Arial" panose="020B0604020202020204" pitchFamily="34" charset="0"/>
+              <a:buChar char="•"/>
+            </a:pPr>
+            <a:endParaRPr lang="en-US" sz="2400" dirty="0"/>
+          </a:p>
+          <a:p>
+            <a:pPr marL="285750" indent="-285750">
+              <a:buFont typeface="Arial" panose="020B0604020202020204" pitchFamily="34" charset="0"/>
+              <a:buChar char="•"/>
+            </a:pPr>
+            <a:r>
+              <a:rPr lang="en-US" sz="2400" dirty="0"/>
+              <a:t>IF we had to do it again what could we do differently:</a:t>
+            </a:r>
+          </a:p>
+          <a:p>
+            <a:pPr marL="742950" lvl="1" indent="-285750">
+              <a:buFont typeface="Arial" panose="020B0604020202020204" pitchFamily="34" charset="0"/>
+              <a:buChar char="•"/>
+            </a:pPr>
+            <a:r>
+              <a:rPr lang="en-US" sz="2400" dirty="0"/>
+              <a:t>Additional datasets could have given us a perhaps a different perspective on what questions we could ask about our topic. </a:t>
+            </a:r>
+          </a:p>
+        </p:txBody>
+      </p:sp>
     </p:spTree>
     <p:extLst>
       <p:ext uri="{BB962C8B-B14F-4D97-AF65-F5344CB8AC3E}">
@@ -18538,13 +18274,13 @@
   <p:clrMapOvr>
     <a:masterClrMapping/>
   </p:clrMapOvr>
-  <mc:AlternateContent xmlns:mc="http://schemas.openxmlformats.org/markup-compatibility/2006">
-    <mc:Choice xmlns:p14="http://schemas.microsoft.com/office/powerpoint/2010/main" Requires="p14">
+  <mc:AlternateContent xmlns:mc="http://schemas.openxmlformats.org/markup-compatibility/2006" xmlns:p14="http://schemas.microsoft.com/office/powerpoint/2010/main">
+    <mc:Choice Requires="p14">
       <p:transition spd="med" p14:dur="700">
         <p:fade/>
       </p:transition>
     </mc:Choice>
-    <mc:Fallback>
+    <mc:Fallback xmlns="">
       <p:transition spd="med">
         <p:fade/>
       </p:transition>
@@ -18553,7 +18289,7 @@
 </p:sld>
 </file>
 
-<file path=ppt/slides/slide15.xml><?xml version="1.0" encoding="utf-8"?>
+<file path=ppt/slides/slide14.xml><?xml version="1.0" encoding="utf-8"?>
 <p:sld xmlns:a="http://schemas.openxmlformats.org/drawingml/2006/main" xmlns:r="http://schemas.openxmlformats.org/officeDocument/2006/relationships" xmlns:p="http://schemas.openxmlformats.org/presentationml/2006/main">
   <p:cSld>
     <p:bg>
@@ -18963,13 +18699,13 @@
   <p:clrMapOvr>
     <a:masterClrMapping/>
   </p:clrMapOvr>
-  <mc:AlternateContent xmlns:mc="http://schemas.openxmlformats.org/markup-compatibility/2006">
-    <mc:Choice xmlns:p14="http://schemas.microsoft.com/office/powerpoint/2010/main" Requires="p14">
+  <mc:AlternateContent xmlns:mc="http://schemas.openxmlformats.org/markup-compatibility/2006" xmlns:p14="http://schemas.microsoft.com/office/powerpoint/2010/main">
+    <mc:Choice Requires="p14">
       <p:transition spd="med" p14:dur="700">
         <p:fade/>
       </p:transition>
     </mc:Choice>
-    <mc:Fallback>
+    <mc:Fallback xmlns="">
       <p:transition spd="med">
         <p:fade/>
       </p:transition>
@@ -19018,7 +18754,7 @@
           <a:p>
             <a:r>
               <a:rPr lang="en-US" dirty="0"/>
-              <a:t>Motivation</a:t>
+              <a:t>Motivation and Summary</a:t>
             </a:r>
           </a:p>
         </p:txBody>
@@ -19041,17 +18777,32 @@
         </p:nvSpPr>
         <p:spPr>
           <a:xfrm>
-            <a:off x="619592" y="4223084"/>
-            <a:ext cx="10952813" cy="2054280"/>
+            <a:off x="619592" y="2080727"/>
+            <a:ext cx="10952813" cy="4599991"/>
           </a:xfrm>
         </p:spPr>
         <p:txBody>
           <a:bodyPr>
-            <a:normAutofit fontScale="92500"/>
+            <a:normAutofit fontScale="62500" lnSpcReduction="20000"/>
           </a:bodyPr>
           <a:lstStyle/>
           <a:p>
-            <a:pPr marL="0" indent="0" algn="ctr">
+            <a:pPr marL="0" indent="0">
+              <a:buNone/>
+            </a:pPr>
+            <a:r>
+              <a:rPr lang="en-US" sz="3600" dirty="0"/>
+              <a:t>In the US, California is known for their wines, but do they have the “best” wines in the world? How might we go about trying to prove it?</a:t>
+            </a:r>
+          </a:p>
+          <a:p>
+            <a:pPr marL="0" indent="0">
+              <a:buNone/>
+            </a:pPr>
+            <a:endParaRPr lang="en-US" sz="3600" dirty="0"/>
+          </a:p>
+          <a:p>
+            <a:pPr marL="0" indent="0">
               <a:buNone/>
             </a:pPr>
             <a:r>
@@ -19064,8 +18815,41 @@
             </a:r>
           </a:p>
           <a:p>
-            <a:pPr lvl="1"/>
-            <a:endParaRPr lang="en-US" dirty="0"/>
+            <a:pPr marL="0" indent="0">
+              <a:buNone/>
+            </a:pPr>
+            <a:endParaRPr lang="en-US" sz="3600" dirty="0"/>
+          </a:p>
+          <a:p>
+            <a:r>
+              <a:rPr lang="en-US" sz="3600" dirty="0"/>
+              <a:t>What should we consider when defining the “best” wine?</a:t>
+            </a:r>
+          </a:p>
+          <a:p>
+            <a:endParaRPr lang="en-US" sz="3600" dirty="0"/>
+          </a:p>
+          <a:p>
+            <a:r>
+              <a:rPr lang="en-US" sz="3600" dirty="0"/>
+              <a:t>How to go about defining which properties make the “best” wine quantitatively, based on review data?</a:t>
+            </a:r>
+          </a:p>
+          <a:p>
+            <a:endParaRPr lang="en-US" sz="3600" dirty="0"/>
+          </a:p>
+          <a:p>
+            <a:r>
+              <a:rPr lang="en-US" sz="3200" dirty="0"/>
+              <a:t>To answer the above questions we explored data from Wine Reviews: </a:t>
+            </a:r>
+            <a:r>
+              <a:rPr lang="en-US" sz="3200" dirty="0">
+                <a:hlinkClick r:id="rId3"/>
+              </a:rPr>
+              <a:t>https://www.kaggle.com/zynicide/wine-reviews</a:t>
+            </a:r>
+            <a:endParaRPr lang="en-US" sz="3200" dirty="0"/>
           </a:p>
           <a:p>
             <a:pPr lvl="1"/>
@@ -19076,41 +18860,6 @@
               <a:buNone/>
             </a:pPr>
             <a:endParaRPr lang="en-US" dirty="0"/>
-          </a:p>
-        </p:txBody>
-      </p:sp>
-      <p:sp>
-        <p:nvSpPr>
-          <p:cNvPr id="4" name="TextBox 3">
-            <a:extLst>
-              <a:ext uri="{FF2B5EF4-FFF2-40B4-BE49-F238E27FC236}">
-                <a16:creationId xmlns:a16="http://schemas.microsoft.com/office/drawing/2014/main" id="{BDC439ED-0928-47D6-ADDF-69F1378EA8FF}"/>
-              </a:ext>
-            </a:extLst>
-          </p:cNvPr>
-          <p:cNvSpPr txBox="1"/>
-          <p:nvPr/>
-        </p:nvSpPr>
-        <p:spPr>
-          <a:xfrm>
-            <a:off x="680321" y="2310063"/>
-            <a:ext cx="10436858" cy="1754326"/>
-          </a:xfrm>
-          <a:prstGeom prst="rect">
-            <a:avLst/>
-          </a:prstGeom>
-          <a:noFill/>
-        </p:spPr>
-        <p:txBody>
-          <a:bodyPr wrap="square" rtlCol="0">
-            <a:spAutoFit/>
-          </a:bodyPr>
-          <a:lstStyle/>
-          <a:p>
-            <a:r>
-              <a:rPr lang="en-US" sz="3600" dirty="0"/>
-              <a:t>In the US, California is known for their wines, but do they have the “best” wines in the world? How might we go about trying to prove it?</a:t>
-            </a:r>
           </a:p>
         </p:txBody>
       </p:sp>
@@ -19124,13 +18873,13 @@
   <p:clrMapOvr>
     <a:masterClrMapping/>
   </p:clrMapOvr>
-  <mc:AlternateContent xmlns:mc="http://schemas.openxmlformats.org/markup-compatibility/2006">
-    <mc:Choice xmlns:p14="http://schemas.microsoft.com/office/powerpoint/2010/main" Requires="p14">
+  <mc:AlternateContent xmlns:mc="http://schemas.openxmlformats.org/markup-compatibility/2006" xmlns:p14="http://schemas.microsoft.com/office/powerpoint/2010/main">
+    <mc:Choice Requires="p14">
       <p:transition spd="med" p14:dur="700">
         <p:fade/>
       </p:transition>
     </mc:Choice>
-    <mc:Fallback>
+    <mc:Fallback xmlns="">
       <p:transition spd="med">
         <p:fade/>
       </p:transition>
@@ -19161,7 +18910,7 @@
           <p:cNvPr id="2" name="Title 1">
             <a:extLst>
               <a:ext uri="{FF2B5EF4-FFF2-40B4-BE49-F238E27FC236}">
-                <a16:creationId xmlns:a16="http://schemas.microsoft.com/office/drawing/2014/main" id="{E0A89D47-7403-4A75-905B-A7192540235A}"/>
+                <a16:creationId xmlns:a16="http://schemas.microsoft.com/office/drawing/2014/main" id="{AE646968-D10E-4B36-B76B-EDE341A1A539}"/>
               </a:ext>
             </a:extLst>
           </p:cNvPr>
@@ -19179,7 +18928,7 @@
           <a:p>
             <a:r>
               <a:rPr lang="en-US" dirty="0"/>
-              <a:t>Summary</a:t>
+              <a:t>Questions and Data</a:t>
             </a:r>
           </a:p>
         </p:txBody>
@@ -19189,7 +18938,7 @@
           <p:cNvPr id="3" name="Content Placeholder 2">
             <a:extLst>
               <a:ext uri="{FF2B5EF4-FFF2-40B4-BE49-F238E27FC236}">
-                <a16:creationId xmlns:a16="http://schemas.microsoft.com/office/drawing/2014/main" id="{074C4827-8882-427F-85E0-2C00CF3E3BE6}"/>
+                <a16:creationId xmlns:a16="http://schemas.microsoft.com/office/drawing/2014/main" id="{8DE115DE-2862-4472-8C10-6D1FCC90F1EB}"/>
               </a:ext>
             </a:extLst>
           </p:cNvPr>
@@ -19202,81 +18951,101 @@
         </p:nvSpPr>
         <p:spPr>
           <a:xfrm>
-            <a:off x="680320" y="2156399"/>
-            <a:ext cx="10761712" cy="4075959"/>
+            <a:off x="499847" y="2149129"/>
+            <a:ext cx="10737648" cy="4484936"/>
           </a:xfrm>
         </p:spPr>
         <p:txBody>
           <a:bodyPr>
-            <a:normAutofit lnSpcReduction="10000"/>
+            <a:normAutofit/>
           </a:bodyPr>
           <a:lstStyle/>
           <a:p>
             <a:r>
+              <a:rPr lang="en-US" b="1" dirty="0"/>
+              <a:t>Other Questions Asked</a:t>
+            </a:r>
+            <a:r>
               <a:rPr lang="en-US" dirty="0"/>
-              <a:t>What to considered when defining the “best” wine?</a:t>
-            </a:r>
-          </a:p>
-          <a:p>
+              <a:t>:</a:t>
+            </a:r>
+          </a:p>
+          <a:p>
+            <a:pPr lvl="1"/>
             <a:r>
               <a:rPr lang="en-US" dirty="0"/>
-              <a:t>How to go about defining the what properties make a wine “best” quantitatively based on review data?</a:t>
-            </a:r>
-          </a:p>
-          <a:p>
+              <a:t>How would we find which are the top 20 most reviewed states/provinces?</a:t>
+            </a:r>
+          </a:p>
+          <a:p>
+            <a:pPr lvl="1"/>
+            <a:endParaRPr lang="en-US" dirty="0"/>
+          </a:p>
+          <a:p>
+            <a:pPr lvl="1"/>
             <a:r>
               <a:rPr lang="en-US" dirty="0"/>
-              <a:t>Questions:</a:t>
+              <a:t>Does California produce the highest quality (professionally rated) wine compared others?  </a:t>
             </a:r>
           </a:p>
           <a:p>
             <a:pPr lvl="1"/>
-            <a:r>
-              <a:rPr lang="en-US" sz="2400" dirty="0"/>
-              <a:t>Does California produce the highest quality (professionally rated) wine compared other places of origin?</a:t>
-            </a:r>
+            <a:endParaRPr lang="en-US" dirty="0"/>
           </a:p>
           <a:p>
             <a:pPr lvl="1"/>
-            <a:endParaRPr lang="en-US" sz="2400" dirty="0"/>
+            <a:r>
+              <a:rPr lang="en-US" dirty="0"/>
+              <a:t>How does California wine reviews compare to the rest of the world when it comes to the variety of wines reviewed? </a:t>
+            </a:r>
           </a:p>
           <a:p>
             <a:pPr lvl="1"/>
-            <a:r>
-              <a:rPr lang="en-US" sz="2400" dirty="0"/>
-              <a:t>How do Californian wine reviews compare to the rest of the world when it comes to the variety of wines reviewed?</a:t>
-            </a:r>
+            <a:endParaRPr lang="en-US" dirty="0"/>
           </a:p>
           <a:p>
             <a:pPr lvl="1"/>
-            <a:endParaRPr lang="en-US" sz="2400" dirty="0"/>
+            <a:r>
+              <a:rPr lang="en-US" dirty="0"/>
+              <a:t>Does spending more (a higher price) get you better (higher reviewed) wine?</a:t>
+            </a:r>
           </a:p>
           <a:p>
             <a:pPr lvl="1"/>
-            <a:r>
-              <a:rPr lang="en-US" sz="2400" dirty="0"/>
-              <a:t>Does spending more (higher price) get you better (higher rated) wine?</a:t>
-            </a:r>
+            <a:endParaRPr lang="en-US" dirty="0"/>
+          </a:p>
+          <a:p>
+            <a:pPr lvl="1"/>
+            <a:r>
+              <a:rPr lang="en-US" dirty="0"/>
+              <a:t>Can we show statistically that wines from California were quantitatively better based on a combination of price and review?</a:t>
+            </a:r>
+          </a:p>
+          <a:p>
+            <a:pPr marL="457200" lvl="1" indent="0">
+              <a:buNone/>
+            </a:pPr>
+            <a:endParaRPr lang="en-US" dirty="0"/>
           </a:p>
         </p:txBody>
       </p:sp>
     </p:spTree>
     <p:extLst>
       <p:ext uri="{BB962C8B-B14F-4D97-AF65-F5344CB8AC3E}">
-        <p14:creationId xmlns:p14="http://schemas.microsoft.com/office/powerpoint/2010/main" val="262993607"/>
+        <p14:creationId xmlns:p14="http://schemas.microsoft.com/office/powerpoint/2010/main" val="3378034161"/>
       </p:ext>
     </p:extLst>
   </p:cSld>
   <p:clrMapOvr>
     <a:masterClrMapping/>
   </p:clrMapOvr>
-  <mc:AlternateContent xmlns:mc="http://schemas.openxmlformats.org/markup-compatibility/2006">
-    <mc:Choice xmlns:p14="http://schemas.microsoft.com/office/powerpoint/2010/main" Requires="p14">
+  <mc:AlternateContent xmlns:mc="http://schemas.openxmlformats.org/markup-compatibility/2006" xmlns:p14="http://schemas.microsoft.com/office/powerpoint/2010/main">
+    <mc:Choice Requires="p14">
       <p:transition spd="med" p14:dur="700">
         <p:fade/>
       </p:transition>
     </mc:Choice>
-    <mc:Fallback>
+    <mc:Fallback xmlns="">
       <p:transition spd="med">
         <p:fade/>
       </p:transition>
@@ -19288,6 +19057,41 @@
 <file path=ppt/slides/slide4.xml><?xml version="1.0" encoding="utf-8"?>
 <p:sld xmlns:a="http://schemas.openxmlformats.org/drawingml/2006/main" xmlns:r="http://schemas.openxmlformats.org/officeDocument/2006/relationships" xmlns:p="http://schemas.openxmlformats.org/presentationml/2006/main">
   <p:cSld>
+    <p:bg>
+      <p:bgPr>
+        <a:gradFill rotWithShape="1">
+          <a:gsLst>
+            <a:gs pos="0">
+              <a:schemeClr val="bg2">
+                <a:tint val="96000"/>
+                <a:shade val="100000"/>
+                <a:hueMod val="106000"/>
+                <a:satMod val="220000"/>
+                <a:lumMod val="140000"/>
+              </a:schemeClr>
+            </a:gs>
+            <a:gs pos="50000">
+              <a:schemeClr val="bg2">
+                <a:shade val="100000"/>
+                <a:hueMod val="100000"/>
+                <a:satMod val="110000"/>
+                <a:lumMod val="130000"/>
+              </a:schemeClr>
+            </a:gs>
+            <a:gs pos="100000">
+              <a:schemeClr val="bg2">
+                <a:shade val="69000"/>
+                <a:hueMod val="88000"/>
+                <a:satMod val="160000"/>
+                <a:lumMod val="69000"/>
+              </a:schemeClr>
+            </a:gs>
+          </a:gsLst>
+          <a:lin ang="2520000" scaled="0"/>
+        </a:gradFill>
+        <a:effectLst/>
+      </p:bgPr>
+    </p:bg>
     <p:spTree>
       <p:nvGrpSpPr>
         <p:cNvPr id="1" name=""/>
@@ -19307,7 +19111,7 @@
           <p:cNvPr id="2" name="Title 1">
             <a:extLst>
               <a:ext uri="{FF2B5EF4-FFF2-40B4-BE49-F238E27FC236}">
-                <a16:creationId xmlns:a16="http://schemas.microsoft.com/office/drawing/2014/main" id="{AE646968-D10E-4B36-B76B-EDE341A1A539}"/>
+                <a16:creationId xmlns:a16="http://schemas.microsoft.com/office/drawing/2014/main" id="{781A3826-70ED-4C19-A21D-C4FD215B4371}"/>
               </a:ext>
             </a:extLst>
           </p:cNvPr>
@@ -19320,12 +19124,14 @@
         </p:nvSpPr>
         <p:spPr/>
         <p:txBody>
-          <a:bodyPr/>
+          <a:bodyPr>
+            <a:normAutofit/>
+          </a:bodyPr>
           <a:lstStyle/>
           <a:p>
             <a:r>
               <a:rPr lang="en-US" dirty="0"/>
-              <a:t>Questions and Data</a:t>
+              <a:t>Data Cleanup and Exploration</a:t>
             </a:r>
           </a:p>
         </p:txBody>
@@ -19335,7 +19141,7 @@
           <p:cNvPr id="3" name="Content Placeholder 2">
             <a:extLst>
               <a:ext uri="{FF2B5EF4-FFF2-40B4-BE49-F238E27FC236}">
-                <a16:creationId xmlns:a16="http://schemas.microsoft.com/office/drawing/2014/main" id="{8DE115DE-2862-4472-8C10-6D1FCC90F1EB}"/>
+                <a16:creationId xmlns:a16="http://schemas.microsoft.com/office/drawing/2014/main" id="{EB3E2852-0E50-4CDE-B0D3-D4864C8F5633}"/>
               </a:ext>
             </a:extLst>
           </p:cNvPr>
@@ -19343,13 +19149,13 @@
             <a:spLocks noGrp="1"/>
           </p:cNvSpPr>
           <p:nvPr>
-            <p:ph idx="1"/>
+            <p:ph idx="4294967295"/>
           </p:nvPr>
         </p:nvSpPr>
         <p:spPr>
           <a:xfrm>
-            <a:off x="499847" y="2149129"/>
-            <a:ext cx="10737648" cy="4251671"/>
+            <a:off x="680321" y="2712873"/>
+            <a:ext cx="4285546" cy="3092609"/>
           </a:xfrm>
         </p:spPr>
         <p:txBody>
@@ -19359,101 +19165,89 @@
           <a:lstStyle/>
           <a:p>
             <a:r>
-              <a:rPr lang="en-US" dirty="0"/>
-              <a:t>To answer the above questions we explored data from Wine Reviews : </a:t>
-            </a:r>
-            <a:r>
-              <a:rPr lang="en-US" dirty="0">
+              <a:rPr lang="en-US" sz="1900" dirty="0"/>
+              <a:t>Initial data collected from </a:t>
+            </a:r>
+            <a:r>
+              <a:rPr lang="en-US" sz="1900" dirty="0">
                 <a:hlinkClick r:id="rId3"/>
               </a:rPr>
               <a:t>https://www.kaggle.com/zynicide/wine-reviews</a:t>
             </a:r>
-            <a:endParaRPr lang="en-US" dirty="0"/>
-          </a:p>
-          <a:p>
-            <a:r>
-              <a:rPr lang="en-US" b="1" dirty="0"/>
-              <a:t>Questions Asked</a:t>
-            </a:r>
-            <a:r>
-              <a:rPr lang="en-US" dirty="0"/>
-              <a:t>:</a:t>
-            </a:r>
-          </a:p>
-          <a:p>
-            <a:pPr lvl="1"/>
-            <a:r>
-              <a:rPr lang="en-US" dirty="0"/>
-              <a:t>Does California produce the highest quality (professionally rated) wine compared others?  </a:t>
-            </a:r>
-            <a:r>
-              <a:rPr lang="en-US" b="1" dirty="0"/>
-              <a:t>Two histograms of CA and Non CA that displays distribution of ratings and Violin plot of prices of California wines and Non-California wines</a:t>
-            </a:r>
-          </a:p>
-          <a:p>
-            <a:pPr lvl="1"/>
-            <a:endParaRPr lang="en-US" b="1" dirty="0"/>
-          </a:p>
-          <a:p>
-            <a:pPr lvl="1"/>
-            <a:r>
-              <a:rPr lang="en-US" dirty="0"/>
-              <a:t>How does California wine reviews compare to the rest of the world when it comes to the variety of wines reviewed? </a:t>
-            </a:r>
-            <a:r>
-              <a:rPr lang="en-US" b="1" dirty="0"/>
-              <a:t>Pie Charts of varieties or bar graphs (CA, Non-CA, GBL)</a:t>
-            </a:r>
-          </a:p>
-          <a:p>
-            <a:pPr lvl="1"/>
-            <a:endParaRPr lang="en-US" b="1" dirty="0"/>
-          </a:p>
-          <a:p>
-            <a:pPr lvl="1"/>
-            <a:r>
-              <a:rPr lang="en-US" dirty="0"/>
-              <a:t>Does spending more get you better wine?  </a:t>
-            </a:r>
-            <a:r>
-              <a:rPr lang="en-US" b="1" dirty="0"/>
-              <a:t>Two scatterplots with </a:t>
-            </a:r>
-            <a:r>
-              <a:rPr lang="en-US" b="1" dirty="0" err="1"/>
-              <a:t>lingress</a:t>
-            </a:r>
-            <a:r>
-              <a:rPr lang="en-US" b="1" dirty="0"/>
-              <a:t>(CA &amp; GBL)</a:t>
-            </a:r>
-          </a:p>
-          <a:p>
-            <a:pPr marL="0" indent="0">
-              <a:buNone/>
-            </a:pPr>
-            <a:endParaRPr lang="en-US" dirty="0"/>
+            <a:endParaRPr lang="en-US" sz="1900" dirty="0"/>
+          </a:p>
+          <a:p>
+            <a:r>
+              <a:rPr lang="en-US" sz="1900" dirty="0"/>
+              <a:t>Our original dataset contained 129,971 records of wine reviews scrapped data was scraped from  </a:t>
+            </a:r>
+            <a:r>
+              <a:rPr lang="en-US" sz="1900" dirty="0" err="1">
+                <a:hlinkClick r:id="rId4"/>
+              </a:rPr>
+              <a:t>WineEnthusiast</a:t>
+            </a:r>
+            <a:r>
+              <a:rPr lang="en-US" sz="1900" dirty="0"/>
+              <a:t> on November 22nd, 2017</a:t>
+            </a:r>
+          </a:p>
+          <a:p>
+            <a:r>
+              <a:rPr lang="en-US" sz="1900" dirty="0"/>
+              <a:t>We wanted to look at the where, what type, who, and how much?</a:t>
+            </a:r>
+            <a:endParaRPr lang="en-US" sz="1400" dirty="0"/>
           </a:p>
         </p:txBody>
       </p:sp>
+      <p:pic>
+        <p:nvPicPr>
+          <p:cNvPr id="5" name="Picture 4">
+            <a:extLst>
+              <a:ext uri="{FF2B5EF4-FFF2-40B4-BE49-F238E27FC236}">
+                <a16:creationId xmlns:a16="http://schemas.microsoft.com/office/drawing/2014/main" id="{F31E8753-54F9-4BFA-821F-9F620C38426B}"/>
+              </a:ext>
+            </a:extLst>
+          </p:cNvPr>
+          <p:cNvPicPr>
+            <a:picLocks noChangeAspect="1"/>
+          </p:cNvPicPr>
+          <p:nvPr/>
+        </p:nvPicPr>
+        <p:blipFill>
+          <a:blip r:embed="rId5"/>
+          <a:stretch>
+            <a:fillRect/>
+          </a:stretch>
+        </p:blipFill>
+        <p:spPr>
+          <a:xfrm>
+            <a:off x="5098686" y="2712874"/>
+            <a:ext cx="6872736" cy="3092609"/>
+          </a:xfrm>
+          <a:prstGeom prst="rect">
+            <a:avLst/>
+          </a:prstGeom>
+        </p:spPr>
+      </p:pic>
     </p:spTree>
     <p:extLst>
       <p:ext uri="{BB962C8B-B14F-4D97-AF65-F5344CB8AC3E}">
-        <p14:creationId xmlns:p14="http://schemas.microsoft.com/office/powerpoint/2010/main" val="3378034161"/>
+        <p14:creationId xmlns:p14="http://schemas.microsoft.com/office/powerpoint/2010/main" val="2618961013"/>
       </p:ext>
     </p:extLst>
   </p:cSld>
   <p:clrMapOvr>
     <a:masterClrMapping/>
   </p:clrMapOvr>
-  <mc:AlternateContent xmlns:mc="http://schemas.openxmlformats.org/markup-compatibility/2006">
-    <mc:Choice xmlns:p14="http://schemas.microsoft.com/office/powerpoint/2010/main" Requires="p14">
+  <mc:AlternateContent xmlns:mc="http://schemas.openxmlformats.org/markup-compatibility/2006" xmlns:p14="http://schemas.microsoft.com/office/powerpoint/2010/main">
+    <mc:Choice Requires="p14">
       <p:transition spd="med" p14:dur="700">
         <p:fade/>
       </p:transition>
     </mc:Choice>
-    <mc:Fallback>
+    <mc:Fallback xmlns="">
       <p:transition spd="med">
         <p:fade/>
       </p:transition>
@@ -19514,214 +19308,6 @@
           <a:chExt cx="0" cy="0"/>
         </a:xfrm>
       </p:grpSpPr>
-      <p:sp>
-        <p:nvSpPr>
-          <p:cNvPr id="2" name="Title 1">
-            <a:extLst>
-              <a:ext uri="{FF2B5EF4-FFF2-40B4-BE49-F238E27FC236}">
-                <a16:creationId xmlns:a16="http://schemas.microsoft.com/office/drawing/2014/main" id="{781A3826-70ED-4C19-A21D-C4FD215B4371}"/>
-              </a:ext>
-            </a:extLst>
-          </p:cNvPr>
-          <p:cNvSpPr>
-            <a:spLocks noGrp="1"/>
-          </p:cNvSpPr>
-          <p:nvPr>
-            <p:ph type="title"/>
-          </p:nvPr>
-        </p:nvSpPr>
-        <p:spPr/>
-        <p:txBody>
-          <a:bodyPr>
-            <a:normAutofit/>
-          </a:bodyPr>
-          <a:lstStyle/>
-          <a:p>
-            <a:r>
-              <a:rPr lang="en-US" dirty="0"/>
-              <a:t>Data Cleanup and Exploration</a:t>
-            </a:r>
-          </a:p>
-        </p:txBody>
-      </p:sp>
-      <p:sp>
-        <p:nvSpPr>
-          <p:cNvPr id="3" name="Content Placeholder 2">
-            <a:extLst>
-              <a:ext uri="{FF2B5EF4-FFF2-40B4-BE49-F238E27FC236}">
-                <a16:creationId xmlns:a16="http://schemas.microsoft.com/office/drawing/2014/main" id="{EB3E2852-0E50-4CDE-B0D3-D4864C8F5633}"/>
-              </a:ext>
-            </a:extLst>
-          </p:cNvPr>
-          <p:cNvSpPr>
-            <a:spLocks noGrp="1"/>
-          </p:cNvSpPr>
-          <p:nvPr>
-            <p:ph idx="4294967295"/>
-          </p:nvPr>
-        </p:nvSpPr>
-        <p:spPr>
-          <a:xfrm>
-            <a:off x="680322" y="2302542"/>
-            <a:ext cx="4285546" cy="3913272"/>
-          </a:xfrm>
-        </p:spPr>
-        <p:txBody>
-          <a:bodyPr>
-            <a:normAutofit/>
-          </a:bodyPr>
-          <a:lstStyle/>
-          <a:p>
-            <a:r>
-              <a:rPr lang="en-US" sz="1900" dirty="0"/>
-              <a:t>Initial data collected from </a:t>
-            </a:r>
-            <a:r>
-              <a:rPr lang="en-US" sz="1900" dirty="0">
-                <a:hlinkClick r:id="rId3"/>
-              </a:rPr>
-              <a:t>https://www.kaggle.com/zynicide/wine-reviews</a:t>
-            </a:r>
-            <a:endParaRPr lang="en-US" sz="1900" dirty="0"/>
-          </a:p>
-          <a:p>
-            <a:r>
-              <a:rPr lang="en-US" sz="1900" dirty="0"/>
-              <a:t>Our original dataset contained 129971 records of wine reviews scrapped data was scraped from  </a:t>
-            </a:r>
-            <a:r>
-              <a:rPr lang="en-US" sz="1900" dirty="0" err="1">
-                <a:hlinkClick r:id="rId4"/>
-              </a:rPr>
-              <a:t>WineEnthusiast</a:t>
-            </a:r>
-            <a:r>
-              <a:rPr lang="en-US" sz="1900" dirty="0"/>
-              <a:t> on November 22nd, 2017</a:t>
-            </a:r>
-          </a:p>
-          <a:p>
-            <a:r>
-              <a:rPr lang="en-US" sz="1900" dirty="0"/>
-              <a:t>We dropped several columns not relevant to our data.</a:t>
-            </a:r>
-          </a:p>
-          <a:p>
-            <a:r>
-              <a:rPr lang="en-US" sz="1900" dirty="0"/>
-              <a:t>We wanted to look at the where, what type, who, and how much?</a:t>
-            </a:r>
-            <a:endParaRPr lang="en-US" sz="1400" dirty="0"/>
-          </a:p>
-        </p:txBody>
-      </p:sp>
-      <p:pic>
-        <p:nvPicPr>
-          <p:cNvPr id="5" name="Picture 4">
-            <a:extLst>
-              <a:ext uri="{FF2B5EF4-FFF2-40B4-BE49-F238E27FC236}">
-                <a16:creationId xmlns:a16="http://schemas.microsoft.com/office/drawing/2014/main" id="{F31E8753-54F9-4BFA-821F-9F620C38426B}"/>
-              </a:ext>
-            </a:extLst>
-          </p:cNvPr>
-          <p:cNvPicPr>
-            <a:picLocks noChangeAspect="1"/>
-          </p:cNvPicPr>
-          <p:nvPr/>
-        </p:nvPicPr>
-        <p:blipFill>
-          <a:blip r:embed="rId5"/>
-          <a:stretch>
-            <a:fillRect/>
-          </a:stretch>
-        </p:blipFill>
-        <p:spPr>
-          <a:xfrm>
-            <a:off x="5098686" y="2712874"/>
-            <a:ext cx="6872736" cy="3092609"/>
-          </a:xfrm>
-          <a:prstGeom prst="rect">
-            <a:avLst/>
-          </a:prstGeom>
-        </p:spPr>
-      </p:pic>
-    </p:spTree>
-    <p:extLst>
-      <p:ext uri="{BB962C8B-B14F-4D97-AF65-F5344CB8AC3E}">
-        <p14:creationId xmlns:p14="http://schemas.microsoft.com/office/powerpoint/2010/main" val="2618961013"/>
-      </p:ext>
-    </p:extLst>
-  </p:cSld>
-  <p:clrMapOvr>
-    <a:masterClrMapping/>
-  </p:clrMapOvr>
-  <mc:AlternateContent xmlns:mc="http://schemas.openxmlformats.org/markup-compatibility/2006">
-    <mc:Choice xmlns:p14="http://schemas.microsoft.com/office/powerpoint/2010/main" Requires="p14">
-      <p:transition spd="med" p14:dur="700">
-        <p:fade/>
-      </p:transition>
-    </mc:Choice>
-    <mc:Fallback>
-      <p:transition spd="med">
-        <p:fade/>
-      </p:transition>
-    </mc:Fallback>
-  </mc:AlternateContent>
-</p:sld>
-</file>
-
-<file path=ppt/slides/slide6.xml><?xml version="1.0" encoding="utf-8"?>
-<p:sld xmlns:a="http://schemas.openxmlformats.org/drawingml/2006/main" xmlns:r="http://schemas.openxmlformats.org/officeDocument/2006/relationships" xmlns:p="http://schemas.openxmlformats.org/presentationml/2006/main">
-  <p:cSld>
-    <p:bg>
-      <p:bgPr>
-        <a:gradFill rotWithShape="1">
-          <a:gsLst>
-            <a:gs pos="0">
-              <a:schemeClr val="bg2">
-                <a:tint val="96000"/>
-                <a:shade val="100000"/>
-                <a:hueMod val="106000"/>
-                <a:satMod val="220000"/>
-                <a:lumMod val="140000"/>
-              </a:schemeClr>
-            </a:gs>
-            <a:gs pos="50000">
-              <a:schemeClr val="bg2">
-                <a:shade val="100000"/>
-                <a:hueMod val="100000"/>
-                <a:satMod val="110000"/>
-                <a:lumMod val="130000"/>
-              </a:schemeClr>
-            </a:gs>
-            <a:gs pos="100000">
-              <a:schemeClr val="bg2">
-                <a:shade val="69000"/>
-                <a:hueMod val="88000"/>
-                <a:satMod val="160000"/>
-                <a:lumMod val="69000"/>
-              </a:schemeClr>
-            </a:gs>
-          </a:gsLst>
-          <a:lin ang="2520000" scaled="0"/>
-        </a:gradFill>
-        <a:effectLst/>
-      </p:bgPr>
-    </p:bg>
-    <p:spTree>
-      <p:nvGrpSpPr>
-        <p:cNvPr id="1" name=""/>
-        <p:cNvGrpSpPr/>
-        <p:nvPr/>
-      </p:nvGrpSpPr>
-      <p:grpSpPr>
-        <a:xfrm>
-          <a:off x="0" y="0"/>
-          <a:ext cx="0" cy="0"/>
-          <a:chOff x="0" y="0"/>
-          <a:chExt cx="0" cy="0"/>
-        </a:xfrm>
-      </p:grpSpPr>
       <p:sp useBgFill="1">
         <p:nvSpPr>
           <p:cNvPr id="10" name="Rectangle 9">
@@ -20068,13 +19654,13 @@
   <p:clrMapOvr>
     <a:masterClrMapping/>
   </p:clrMapOvr>
-  <mc:AlternateContent xmlns:mc="http://schemas.openxmlformats.org/markup-compatibility/2006">
-    <mc:Choice xmlns:p14="http://schemas.microsoft.com/office/powerpoint/2010/main" Requires="p14">
+  <mc:AlternateContent xmlns:mc="http://schemas.openxmlformats.org/markup-compatibility/2006" xmlns:p14="http://schemas.microsoft.com/office/powerpoint/2010/main">
+    <mc:Choice Requires="p14">
       <p:transition spd="med" p14:dur="700">
         <p:fade/>
       </p:transition>
     </mc:Choice>
-    <mc:Fallback>
+    <mc:Fallback xmlns="">
       <p:transition spd="med">
         <p:fade/>
       </p:transition>
@@ -20083,7 +19669,7 @@
 </p:sld>
 </file>
 
-<file path=ppt/slides/slide7.xml><?xml version="1.0" encoding="utf-8"?>
+<file path=ppt/slides/slide6.xml><?xml version="1.0" encoding="utf-8"?>
 <p:sld xmlns:a="http://schemas.openxmlformats.org/drawingml/2006/main" xmlns:r="http://schemas.openxmlformats.org/officeDocument/2006/relationships" xmlns:p="http://schemas.openxmlformats.org/presentationml/2006/main">
   <p:cSld>
     <p:spTree>
@@ -20158,7 +19744,7 @@
           <a:p>
             <a:r>
               <a:rPr lang="en-US" dirty="0"/>
-              <a:t>In total we made:</a:t>
+              <a:t>In total, we made:</a:t>
             </a:r>
           </a:p>
           <a:p>
@@ -20274,13 +19860,13 @@
   <p:clrMapOvr>
     <a:masterClrMapping/>
   </p:clrMapOvr>
-  <mc:AlternateContent xmlns:mc="http://schemas.openxmlformats.org/markup-compatibility/2006">
-    <mc:Choice xmlns:p14="http://schemas.microsoft.com/office/powerpoint/2010/main" Requires="p14">
+  <mc:AlternateContent xmlns:mc="http://schemas.openxmlformats.org/markup-compatibility/2006" xmlns:p14="http://schemas.microsoft.com/office/powerpoint/2010/main">
+    <mc:Choice Requires="p14">
       <p:transition spd="med" p14:dur="700">
         <p:fade/>
       </p:transition>
     </mc:Choice>
-    <mc:Fallback>
+    <mc:Fallback xmlns="">
       <p:transition spd="med">
         <p:fade/>
       </p:transition>
@@ -20289,7 +19875,7 @@
 </p:sld>
 </file>
 
-<file path=ppt/slides/slide8.xml><?xml version="1.0" encoding="utf-8"?>
+<file path=ppt/slides/slide7.xml><?xml version="1.0" encoding="utf-8"?>
 <p:sld xmlns:a="http://schemas.openxmlformats.org/drawingml/2006/main" xmlns:r="http://schemas.openxmlformats.org/officeDocument/2006/relationships" xmlns:p="http://schemas.openxmlformats.org/presentationml/2006/main">
   <p:cSld>
     <p:spTree>
@@ -20512,8 +20098,8 @@
         </p:blipFill>
         <p:spPr bwMode="auto">
           <a:xfrm>
-            <a:off x="680320" y="3585410"/>
-            <a:ext cx="6132105" cy="2933843"/>
+            <a:off x="962025" y="3585410"/>
+            <a:ext cx="5850400" cy="2933843"/>
           </a:xfrm>
           <a:prstGeom prst="rect">
             <a:avLst/>
@@ -20540,13 +20126,13 @@
   <p:clrMapOvr>
     <a:masterClrMapping/>
   </p:clrMapOvr>
-  <mc:AlternateContent xmlns:mc="http://schemas.openxmlformats.org/markup-compatibility/2006">
-    <mc:Choice xmlns:p14="http://schemas.microsoft.com/office/powerpoint/2010/main" Requires="p14">
+  <mc:AlternateContent xmlns:mc="http://schemas.openxmlformats.org/markup-compatibility/2006" xmlns:p14="http://schemas.microsoft.com/office/powerpoint/2010/main">
+    <mc:Choice Requires="p14">
       <p:transition spd="med" p14:dur="700">
         <p:fade/>
       </p:transition>
     </mc:Choice>
-    <mc:Fallback>
+    <mc:Fallback xmlns="">
       <p:transition spd="med">
         <p:fade/>
       </p:transition>
@@ -20555,7 +20141,7 @@
 </p:sld>
 </file>
 
-<file path=ppt/slides/slide9.xml><?xml version="1.0" encoding="utf-8"?>
+<file path=ppt/slides/slide8.xml><?xml version="1.0" encoding="utf-8"?>
 <p:sld xmlns:a="http://schemas.openxmlformats.org/drawingml/2006/main" xmlns:r="http://schemas.openxmlformats.org/officeDocument/2006/relationships" xmlns:p="http://schemas.openxmlformats.org/presentationml/2006/main">
   <p:cSld>
     <p:spTree>
@@ -20620,8 +20206,8 @@
         </p:nvSpPr>
         <p:spPr>
           <a:xfrm>
-            <a:off x="84003" y="3007736"/>
-            <a:ext cx="4730029" cy="2817108"/>
+            <a:off x="279918" y="3007736"/>
+            <a:ext cx="4338735" cy="2817108"/>
           </a:xfrm>
         </p:spPr>
         <p:txBody>
@@ -20631,51 +20217,33 @@
           <a:lstStyle/>
           <a:p>
             <a:r>
-              <a:rPr lang="en-US" sz="2000" b="1" dirty="0"/>
-              <a:t>Average professional rating of 33526 reviews of Californian wines is 88.619,</a:t>
+              <a:rPr lang="en-US" sz="2200" b="1" dirty="0"/>
+              <a:t>Average professional rating of 33,526 reviews of Californian wines is 88.619, and 88.325 for all other wines.</a:t>
             </a:r>
           </a:p>
           <a:p>
             <a:pPr marL="0" indent="0">
               <a:buNone/>
             </a:pPr>
-            <a:r>
-              <a:rPr lang="en-US" sz="2000" b="1" dirty="0"/>
-              <a:t>   and 88.325 for all other wines.</a:t>
-            </a:r>
-          </a:p>
-          <a:p>
-            <a:pPr marL="0" indent="0">
-              <a:buNone/>
-            </a:pPr>
-            <a:endParaRPr lang="en-US" sz="2000" b="1" dirty="0"/>
-          </a:p>
-          <a:p>
-            <a:r>
-              <a:rPr lang="en-US" sz="2000" b="1" dirty="0"/>
-              <a:t>Greater variability of ratings among </a:t>
-            </a:r>
-          </a:p>
-          <a:p>
-            <a:pPr marL="0" indent="0">
-              <a:buNone/>
-            </a:pPr>
-            <a:r>
-              <a:rPr lang="en-US" sz="2000" b="1" dirty="0"/>
-              <a:t>   California wine reviews.</a:t>
-            </a:r>
-          </a:p>
-          <a:p>
-            <a:endParaRPr lang="en-US" sz="2000" b="1" dirty="0"/>
-          </a:p>
-          <a:p>
-            <a:endParaRPr lang="en-US" sz="2000" b="1" dirty="0"/>
-          </a:p>
-          <a:p>
-            <a:endParaRPr lang="en-US" sz="2000" b="1" dirty="0"/>
-          </a:p>
-          <a:p>
-            <a:endParaRPr lang="en-US" sz="2000" dirty="0"/>
+            <a:endParaRPr lang="en-US" sz="2200" b="1" dirty="0"/>
+          </a:p>
+          <a:p>
+            <a:r>
+              <a:rPr lang="en-US" sz="2200" b="1" dirty="0"/>
+              <a:t>Greater variability of ratings among California wine reviews.</a:t>
+            </a:r>
+          </a:p>
+          <a:p>
+            <a:endParaRPr lang="en-US" sz="2200" b="1" dirty="0"/>
+          </a:p>
+          <a:p>
+            <a:endParaRPr lang="en-US" sz="2200" b="1" dirty="0"/>
+          </a:p>
+          <a:p>
+            <a:endParaRPr lang="en-US" sz="2200" b="1" dirty="0"/>
+          </a:p>
+          <a:p>
+            <a:endParaRPr lang="en-US" sz="2200" dirty="0"/>
           </a:p>
         </p:txBody>
       </p:sp>
@@ -20851,13 +20419,319 @@
   <p:clrMapOvr>
     <a:masterClrMapping/>
   </p:clrMapOvr>
-  <mc:AlternateContent xmlns:mc="http://schemas.openxmlformats.org/markup-compatibility/2006">
-    <mc:Choice xmlns:p14="http://schemas.microsoft.com/office/powerpoint/2010/main" Requires="p14">
+  <mc:AlternateContent xmlns:mc="http://schemas.openxmlformats.org/markup-compatibility/2006" xmlns:p14="http://schemas.microsoft.com/office/powerpoint/2010/main">
+    <mc:Choice Requires="p14">
       <p:transition spd="med" p14:dur="700">
         <p:fade/>
       </p:transition>
     </mc:Choice>
-    <mc:Fallback>
+    <mc:Fallback xmlns="">
+      <p:transition spd="med">
+        <p:fade/>
+      </p:transition>
+    </mc:Fallback>
+  </mc:AlternateContent>
+</p:sld>
+</file>
+
+<file path=ppt/slides/slide9.xml><?xml version="1.0" encoding="utf-8"?>
+<p:sld xmlns:a="http://schemas.openxmlformats.org/drawingml/2006/main" xmlns:r="http://schemas.openxmlformats.org/officeDocument/2006/relationships" xmlns:p="http://schemas.openxmlformats.org/presentationml/2006/main">
+  <p:cSld>
+    <p:bg>
+      <p:bgPr>
+        <a:gradFill rotWithShape="1">
+          <a:gsLst>
+            <a:gs pos="0">
+              <a:schemeClr val="bg2">
+                <a:tint val="96000"/>
+                <a:shade val="100000"/>
+                <a:hueMod val="106000"/>
+                <a:satMod val="220000"/>
+                <a:lumMod val="140000"/>
+              </a:schemeClr>
+            </a:gs>
+            <a:gs pos="50000">
+              <a:schemeClr val="bg2">
+                <a:shade val="100000"/>
+                <a:hueMod val="100000"/>
+                <a:satMod val="110000"/>
+                <a:lumMod val="130000"/>
+              </a:schemeClr>
+            </a:gs>
+            <a:gs pos="100000">
+              <a:schemeClr val="bg2">
+                <a:shade val="69000"/>
+                <a:hueMod val="88000"/>
+                <a:satMod val="160000"/>
+                <a:lumMod val="69000"/>
+              </a:schemeClr>
+            </a:gs>
+          </a:gsLst>
+          <a:lin ang="2520000" scaled="0"/>
+        </a:gradFill>
+        <a:effectLst/>
+      </p:bgPr>
+    </p:bg>
+    <p:spTree>
+      <p:nvGrpSpPr>
+        <p:cNvPr id="1" name=""/>
+        <p:cNvGrpSpPr/>
+        <p:nvPr/>
+      </p:nvGrpSpPr>
+      <p:grpSpPr>
+        <a:xfrm>
+          <a:off x="0" y="0"/>
+          <a:ext cx="0" cy="0"/>
+          <a:chOff x="0" y="0"/>
+          <a:chExt cx="0" cy="0"/>
+        </a:xfrm>
+      </p:grpSpPr>
+      <p:sp>
+        <p:nvSpPr>
+          <p:cNvPr id="2" name="Title 1">
+            <a:extLst>
+              <a:ext uri="{FF2B5EF4-FFF2-40B4-BE49-F238E27FC236}">
+                <a16:creationId xmlns:a16="http://schemas.microsoft.com/office/drawing/2014/main" id="{F4EA0C0F-80C1-4432-ADF2-4FD4A189BEBB}"/>
+              </a:ext>
+            </a:extLst>
+          </p:cNvPr>
+          <p:cNvSpPr>
+            <a:spLocks noGrp="1"/>
+          </p:cNvSpPr>
+          <p:nvPr>
+            <p:ph type="title"/>
+          </p:nvPr>
+        </p:nvSpPr>
+        <p:spPr>
+          <a:xfrm>
+            <a:off x="680321" y="753228"/>
+            <a:ext cx="9613861" cy="1080938"/>
+          </a:xfrm>
+        </p:spPr>
+        <p:txBody>
+          <a:bodyPr>
+            <a:normAutofit/>
+          </a:bodyPr>
+          <a:lstStyle/>
+          <a:p>
+            <a:r>
+              <a:rPr lang="en-US" sz="2800" dirty="0"/>
+              <a:t>How does California wine reviews compare to the rest of the world when it comes to the variety of wines reviewed?</a:t>
+            </a:r>
+          </a:p>
+        </p:txBody>
+      </p:sp>
+      <p:sp>
+        <p:nvSpPr>
+          <p:cNvPr id="1032" name="Content Placeholder 1031">
+            <a:extLst>
+              <a:ext uri="{FF2B5EF4-FFF2-40B4-BE49-F238E27FC236}">
+                <a16:creationId xmlns:a16="http://schemas.microsoft.com/office/drawing/2014/main" id="{D315F114-2879-441D-A372-ADC006B3B75D}"/>
+              </a:ext>
+            </a:extLst>
+          </p:cNvPr>
+          <p:cNvSpPr>
+            <a:spLocks noGrp="1"/>
+          </p:cNvSpPr>
+          <p:nvPr>
+            <p:ph idx="1"/>
+          </p:nvPr>
+        </p:nvSpPr>
+        <p:spPr>
+          <a:xfrm>
+            <a:off x="294453" y="2370350"/>
+            <a:ext cx="3091578" cy="3590183"/>
+          </a:xfrm>
+        </p:spPr>
+        <p:txBody>
+          <a:bodyPr>
+            <a:normAutofit fontScale="92500"/>
+          </a:bodyPr>
+          <a:lstStyle/>
+          <a:p>
+            <a:endParaRPr lang="en-US" dirty="0"/>
+          </a:p>
+          <a:p>
+            <a:r>
+              <a:rPr lang="en-US" dirty="0"/>
+              <a:t>Higher variety count found in California</a:t>
+            </a:r>
+          </a:p>
+          <a:p>
+            <a:endParaRPr lang="en-US" dirty="0"/>
+          </a:p>
+          <a:p>
+            <a:r>
+              <a:rPr lang="en-US" dirty="0"/>
+              <a:t>12 of the top 20 varieties found in CA are found within the top 20 varieties globally (excluding CA)</a:t>
+            </a:r>
+          </a:p>
+          <a:p>
+            <a:endParaRPr lang="en-US" dirty="0"/>
+          </a:p>
+          <a:p>
+            <a:pPr marL="0" indent="0">
+              <a:buNone/>
+            </a:pPr>
+            <a:endParaRPr lang="en-US" dirty="0"/>
+          </a:p>
+        </p:txBody>
+      </p:sp>
+      <p:pic>
+        <p:nvPicPr>
+          <p:cNvPr id="1026" name="Picture 2">
+            <a:extLst>
+              <a:ext uri="{FF2B5EF4-FFF2-40B4-BE49-F238E27FC236}">
+                <a16:creationId xmlns:a16="http://schemas.microsoft.com/office/drawing/2014/main" id="{AD16B1AE-B834-4F0E-B75E-37B09C5A85D6}"/>
+              </a:ext>
+            </a:extLst>
+          </p:cNvPr>
+          <p:cNvPicPr>
+            <a:picLocks noChangeAspect="1" noChangeArrowheads="1"/>
+          </p:cNvPicPr>
+          <p:nvPr/>
+        </p:nvPicPr>
+        <p:blipFill rotWithShape="1">
+          <a:blip r:embed="rId2">
+            <a:extLst>
+              <a:ext uri="{28A0092B-C50C-407E-A947-70E740481C1C}">
+                <a14:useLocalDpi xmlns:a14="http://schemas.microsoft.com/office/drawing/2010/main" val="0"/>
+              </a:ext>
+            </a:extLst>
+          </a:blip>
+          <a:srcRect l="2656" r="17740"/>
+          <a:stretch/>
+        </p:blipFill>
+        <p:spPr bwMode="auto">
+          <a:xfrm>
+            <a:off x="3492725" y="2286000"/>
+            <a:ext cx="3762323" cy="4329290"/>
+          </a:xfrm>
+          <a:prstGeom prst="rect">
+            <a:avLst/>
+          </a:prstGeom>
+          <a:noFill/>
+          <a:ln>
+            <a:noFill/>
+          </a:ln>
+          <a:effectLst>
+            <a:outerShdw blurRad="76200" dist="63500" dir="5040000" algn="tl" rotWithShape="0">
+              <a:srgbClr val="000000">
+                <a:alpha val="41000"/>
+              </a:srgbClr>
+            </a:outerShdw>
+          </a:effectLst>
+          <a:extLst>
+            <a:ext uri="{909E8E84-426E-40DD-AFC4-6F175D3DCCD1}">
+              <a14:hiddenFill xmlns:a14="http://schemas.microsoft.com/office/drawing/2010/main">
+                <a:solidFill>
+                  <a:srgbClr val="FFFFFF"/>
+                </a:solidFill>
+              </a14:hiddenFill>
+            </a:ext>
+          </a:extLst>
+        </p:spPr>
+      </p:pic>
+      <p:sp>
+        <p:nvSpPr>
+          <p:cNvPr id="4" name="TextBox 3">
+            <a:extLst>
+              <a:ext uri="{FF2B5EF4-FFF2-40B4-BE49-F238E27FC236}">
+                <a16:creationId xmlns:a16="http://schemas.microsoft.com/office/drawing/2014/main" id="{F7FCB200-52E9-4D10-B10D-F206C66D2C0B}"/>
+              </a:ext>
+            </a:extLst>
+          </p:cNvPr>
+          <p:cNvSpPr txBox="1"/>
+          <p:nvPr/>
+        </p:nvSpPr>
+        <p:spPr>
+          <a:xfrm>
+            <a:off x="7475805" y="2308770"/>
+            <a:ext cx="4421742" cy="400110"/>
+          </a:xfrm>
+          <a:prstGeom prst="rect">
+            <a:avLst/>
+          </a:prstGeom>
+          <a:noFill/>
+        </p:spPr>
+        <p:txBody>
+          <a:bodyPr wrap="square" rtlCol="0">
+            <a:spAutoFit/>
+          </a:bodyPr>
+          <a:lstStyle/>
+          <a:p>
+            <a:r>
+              <a:rPr lang="en-US" sz="1000" b="1" dirty="0"/>
+              <a:t>Breakdown of top 20 varieties of wine globally (excluding CA) by review count </a:t>
+            </a:r>
+            <a:endParaRPr lang="en-US" sz="1000" dirty="0"/>
+          </a:p>
+        </p:txBody>
+      </p:sp>
+      <p:pic>
+        <p:nvPicPr>
+          <p:cNvPr id="1030" name="Picture 6">
+            <a:extLst>
+              <a:ext uri="{FF2B5EF4-FFF2-40B4-BE49-F238E27FC236}">
+                <a16:creationId xmlns:a16="http://schemas.microsoft.com/office/drawing/2014/main" id="{8F549CA4-6651-48D9-B005-3F0A8FAE0178}"/>
+              </a:ext>
+            </a:extLst>
+          </p:cNvPr>
+          <p:cNvPicPr>
+            <a:picLocks noChangeAspect="1" noChangeArrowheads="1"/>
+          </p:cNvPicPr>
+          <p:nvPr/>
+        </p:nvPicPr>
+        <p:blipFill>
+          <a:blip r:embed="rId3">
+            <a:extLst>
+              <a:ext uri="{28A0092B-C50C-407E-A947-70E740481C1C}">
+                <a14:useLocalDpi xmlns:a14="http://schemas.microsoft.com/office/drawing/2010/main" val="0"/>
+              </a:ext>
+            </a:extLst>
+          </a:blip>
+          <a:srcRect/>
+          <a:stretch>
+            <a:fillRect/>
+          </a:stretch>
+        </p:blipFill>
+        <p:spPr bwMode="auto">
+          <a:xfrm>
+            <a:off x="7475805" y="2720912"/>
+            <a:ext cx="4421742" cy="3894378"/>
+          </a:xfrm>
+          <a:prstGeom prst="rect">
+            <a:avLst/>
+          </a:prstGeom>
+          <a:noFill/>
+          <a:extLst>
+            <a:ext uri="{909E8E84-426E-40DD-AFC4-6F175D3DCCD1}">
+              <a14:hiddenFill xmlns:a14="http://schemas.microsoft.com/office/drawing/2010/main">
+                <a:solidFill>
+                  <a:srgbClr val="FFFFFF"/>
+                </a:solidFill>
+              </a14:hiddenFill>
+            </a:ext>
+          </a:extLst>
+        </p:spPr>
+      </p:pic>
+    </p:spTree>
+    <p:extLst>
+      <p:ext uri="{BB962C8B-B14F-4D97-AF65-F5344CB8AC3E}">
+        <p14:creationId xmlns:p14="http://schemas.microsoft.com/office/powerpoint/2010/main" val="578842426"/>
+      </p:ext>
+    </p:extLst>
+  </p:cSld>
+  <p:clrMapOvr>
+    <a:masterClrMapping/>
+  </p:clrMapOvr>
+  <mc:AlternateContent xmlns:mc="http://schemas.openxmlformats.org/markup-compatibility/2006" xmlns:p14="http://schemas.microsoft.com/office/powerpoint/2010/main">
+    <mc:Choice Requires="p14">
+      <p:transition spd="med" p14:dur="700">
+        <p:fade/>
+      </p:transition>
+    </mc:Choice>
+    <mc:Fallback xmlns="">
       <p:transition spd="med">
         <p:fade/>
       </p:transition>

</xml_diff>